<commit_message>
Dtd Dsn Presentation - Updated
</commit_message>
<xml_diff>
--- a/Documents/DetailedDesign Presentation.pptx
+++ b/Documents/DetailedDesign Presentation.pptx
@@ -13,7 +13,8 @@
     <p:sldId id="261" r:id="rId7"/>
     <p:sldId id="262" r:id="rId8"/>
     <p:sldId id="263" r:id="rId9"/>
-    <p:sldId id="264" r:id="rId10"/>
+    <p:sldId id="265" r:id="rId10"/>
+    <p:sldId id="264" r:id="rId11"/>
   </p:sldIdLst>
   <p:sldSz cx="12192000" cy="6858000"/>
   <p:notesSz cx="6858000" cy="9144000"/>
@@ -146,10 +147,10 @@
           <p:nvPr/>
         </p:nvPicPr>
         <p:blipFill>
-          <a:blip r:embed="rId2">
+          <a:blip r:embed="rId2" cstate="print">
             <a:extLst>
               <a:ext uri="{28A0092B-C50C-407E-A947-70E740481C1C}">
-                <a14:useLocalDpi xmlns:a14="http://schemas.microsoft.com/office/drawing/2010/main" val="0"/>
+                <a14:useLocalDpi xmlns:a14="http://schemas.microsoft.com/office/drawing/2010/main" xmlns="" val="0"/>
               </a:ext>
             </a:extLst>
           </a:blip>
@@ -344,6 +345,7 @@
           <a:p>
             <a:fld id="{82DAD41B-C870-4CF8-92A7-5C3761120322}" type="datetimeFigureOut">
               <a:rPr lang="en-GB" smtClean="0"/>
+              <a:pPr/>
               <a:t>03/04/2016</a:t>
             </a:fld>
             <a:endParaRPr lang="en-GB"/>
@@ -396,6 +398,7 @@
           <a:p>
             <a:fld id="{3F7F1F27-6BB8-4210-BD7D-83487C4A09E4}" type="slidenum">
               <a:rPr lang="en-GB" smtClean="0"/>
+              <a:pPr/>
               <a:t>‹#›</a:t>
             </a:fld>
             <a:endParaRPr lang="en-GB"/>
@@ -405,7 +408,7 @@
     </p:spTree>
     <p:extLst>
       <p:ext uri="{BB962C8B-B14F-4D97-AF65-F5344CB8AC3E}">
-        <p14:creationId xmlns:p14="http://schemas.microsoft.com/office/powerpoint/2010/main" val="1082515078"/>
+        <p14:creationId xmlns:p14="http://schemas.microsoft.com/office/powerpoint/2010/main" xmlns="" val="1082515078"/>
       </p:ext>
     </p:extLst>
   </p:cSld>
@@ -441,10 +444,10 @@
           <p:nvPr/>
         </p:nvPicPr>
         <p:blipFill>
-          <a:blip r:embed="rId2">
+          <a:blip r:embed="rId2" cstate="print">
             <a:extLst>
               <a:ext uri="{28A0092B-C50C-407E-A947-70E740481C1C}">
-                <a14:useLocalDpi xmlns:a14="http://schemas.microsoft.com/office/drawing/2010/main" val="0"/>
+                <a14:useLocalDpi xmlns:a14="http://schemas.microsoft.com/office/drawing/2010/main" xmlns="" val="0"/>
               </a:ext>
             </a:extLst>
           </a:blip>
@@ -678,6 +681,7 @@
           <a:p>
             <a:fld id="{82DAD41B-C870-4CF8-92A7-5C3761120322}" type="datetimeFigureOut">
               <a:rPr lang="en-GB" smtClean="0"/>
+              <a:pPr/>
               <a:t>03/04/2016</a:t>
             </a:fld>
             <a:endParaRPr lang="en-GB"/>
@@ -720,6 +724,7 @@
           <a:p>
             <a:fld id="{3F7F1F27-6BB8-4210-BD7D-83487C4A09E4}" type="slidenum">
               <a:rPr lang="en-GB" smtClean="0"/>
+              <a:pPr/>
               <a:t>‹#›</a:t>
             </a:fld>
             <a:endParaRPr lang="en-GB"/>
@@ -729,7 +734,7 @@
     </p:spTree>
     <p:extLst>
       <p:ext uri="{BB962C8B-B14F-4D97-AF65-F5344CB8AC3E}">
-        <p14:creationId xmlns:p14="http://schemas.microsoft.com/office/powerpoint/2010/main" val="2643712938"/>
+        <p14:creationId xmlns:p14="http://schemas.microsoft.com/office/powerpoint/2010/main" xmlns="" val="2643712938"/>
       </p:ext>
     </p:extLst>
   </p:cSld>
@@ -765,10 +770,10 @@
           <p:nvPr/>
         </p:nvPicPr>
         <p:blipFill>
-          <a:blip r:embed="rId2">
+          <a:blip r:embed="rId2" cstate="print">
             <a:extLst>
               <a:ext uri="{28A0092B-C50C-407E-A947-70E740481C1C}">
-                <a14:useLocalDpi xmlns:a14="http://schemas.microsoft.com/office/drawing/2010/main" val="0"/>
+                <a14:useLocalDpi xmlns:a14="http://schemas.microsoft.com/office/drawing/2010/main" xmlns="" val="0"/>
               </a:ext>
             </a:extLst>
           </a:blip>
@@ -956,6 +961,7 @@
           <a:p>
             <a:fld id="{82DAD41B-C870-4CF8-92A7-5C3761120322}" type="datetimeFigureOut">
               <a:rPr lang="en-GB" smtClean="0"/>
+              <a:pPr/>
               <a:t>03/04/2016</a:t>
             </a:fld>
             <a:endParaRPr lang="en-GB"/>
@@ -998,6 +1004,7 @@
           <a:p>
             <a:fld id="{3F7F1F27-6BB8-4210-BD7D-83487C4A09E4}" type="slidenum">
               <a:rPr lang="en-GB" smtClean="0"/>
+              <a:pPr/>
               <a:t>‹#›</a:t>
             </a:fld>
             <a:endParaRPr lang="en-GB"/>
@@ -1007,7 +1014,7 @@
     </p:spTree>
     <p:extLst>
       <p:ext uri="{BB962C8B-B14F-4D97-AF65-F5344CB8AC3E}">
-        <p14:creationId xmlns:p14="http://schemas.microsoft.com/office/powerpoint/2010/main" val="909864963"/>
+        <p14:creationId xmlns:p14="http://schemas.microsoft.com/office/powerpoint/2010/main" xmlns="" val="909864963"/>
       </p:ext>
     </p:extLst>
   </p:cSld>
@@ -1043,10 +1050,10 @@
           <p:nvPr/>
         </p:nvPicPr>
         <p:blipFill>
-          <a:blip r:embed="rId2">
+          <a:blip r:embed="rId2" cstate="print">
             <a:extLst>
               <a:ext uri="{28A0092B-C50C-407E-A947-70E740481C1C}">
-                <a14:useLocalDpi xmlns:a14="http://schemas.microsoft.com/office/drawing/2010/main" val="0"/>
+                <a14:useLocalDpi xmlns:a14="http://schemas.microsoft.com/office/drawing/2010/main" xmlns="" val="0"/>
               </a:ext>
             </a:extLst>
           </a:blip>
@@ -1524,6 +1531,7 @@
           <a:p>
             <a:fld id="{82DAD41B-C870-4CF8-92A7-5C3761120322}" type="datetimeFigureOut">
               <a:rPr lang="en-GB" smtClean="0"/>
+              <a:pPr/>
               <a:t>03/04/2016</a:t>
             </a:fld>
             <a:endParaRPr lang="en-GB"/>
@@ -1566,6 +1574,7 @@
           <a:p>
             <a:fld id="{3F7F1F27-6BB8-4210-BD7D-83487C4A09E4}" type="slidenum">
               <a:rPr lang="en-GB" smtClean="0"/>
+              <a:pPr/>
               <a:t>‹#›</a:t>
             </a:fld>
             <a:endParaRPr lang="en-GB"/>
@@ -1575,7 +1584,7 @@
     </p:spTree>
     <p:extLst>
       <p:ext uri="{BB962C8B-B14F-4D97-AF65-F5344CB8AC3E}">
-        <p14:creationId xmlns:p14="http://schemas.microsoft.com/office/powerpoint/2010/main" val="648401663"/>
+        <p14:creationId xmlns:p14="http://schemas.microsoft.com/office/powerpoint/2010/main" xmlns="" val="648401663"/>
       </p:ext>
     </p:extLst>
   </p:cSld>
@@ -1611,10 +1620,10 @@
           <p:nvPr/>
         </p:nvPicPr>
         <p:blipFill>
-          <a:blip r:embed="rId2">
+          <a:blip r:embed="rId2" cstate="print">
             <a:extLst>
               <a:ext uri="{28A0092B-C50C-407E-A947-70E740481C1C}">
-                <a14:useLocalDpi xmlns:a14="http://schemas.microsoft.com/office/drawing/2010/main" val="0"/>
+                <a14:useLocalDpi xmlns:a14="http://schemas.microsoft.com/office/drawing/2010/main" xmlns="" val="0"/>
               </a:ext>
             </a:extLst>
           </a:blip>
@@ -1802,6 +1811,7 @@
           <a:p>
             <a:fld id="{82DAD41B-C870-4CF8-92A7-5C3761120322}" type="datetimeFigureOut">
               <a:rPr lang="en-GB" smtClean="0"/>
+              <a:pPr/>
               <a:t>03/04/2016</a:t>
             </a:fld>
             <a:endParaRPr lang="en-GB"/>
@@ -1844,6 +1854,7 @@
           <a:p>
             <a:fld id="{3F7F1F27-6BB8-4210-BD7D-83487C4A09E4}" type="slidenum">
               <a:rPr lang="en-GB" smtClean="0"/>
+              <a:pPr/>
               <a:t>‹#›</a:t>
             </a:fld>
             <a:endParaRPr lang="en-GB"/>
@@ -1853,7 +1864,7 @@
     </p:spTree>
     <p:extLst>
       <p:ext uri="{BB962C8B-B14F-4D97-AF65-F5344CB8AC3E}">
-        <p14:creationId xmlns:p14="http://schemas.microsoft.com/office/powerpoint/2010/main" val="3632167985"/>
+        <p14:creationId xmlns:p14="http://schemas.microsoft.com/office/powerpoint/2010/main" xmlns="" val="3632167985"/>
       </p:ext>
     </p:extLst>
   </p:cSld>
@@ -1889,10 +1900,10 @@
           <p:nvPr/>
         </p:nvPicPr>
         <p:blipFill>
-          <a:blip r:embed="rId2">
+          <a:blip r:embed="rId2" cstate="print">
             <a:extLst>
               <a:ext uri="{28A0092B-C50C-407E-A947-70E740481C1C}">
-                <a14:useLocalDpi xmlns:a14="http://schemas.microsoft.com/office/drawing/2010/main" val="0"/>
+                <a14:useLocalDpi xmlns:a14="http://schemas.microsoft.com/office/drawing/2010/main" xmlns="" val="0"/>
               </a:ext>
             </a:extLst>
           </a:blip>
@@ -2364,6 +2375,7 @@
           <a:p>
             <a:fld id="{82DAD41B-C870-4CF8-92A7-5C3761120322}" type="datetimeFigureOut">
               <a:rPr lang="en-GB" smtClean="0"/>
+              <a:pPr/>
               <a:t>03/04/2016</a:t>
             </a:fld>
             <a:endParaRPr lang="en-GB"/>
@@ -2406,6 +2418,7 @@
           <a:p>
             <a:fld id="{3F7F1F27-6BB8-4210-BD7D-83487C4A09E4}" type="slidenum">
               <a:rPr lang="en-GB" smtClean="0"/>
+              <a:pPr/>
               <a:t>‹#›</a:t>
             </a:fld>
             <a:endParaRPr lang="en-GB"/>
@@ -2415,7 +2428,7 @@
     </p:spTree>
     <p:extLst>
       <p:ext uri="{BB962C8B-B14F-4D97-AF65-F5344CB8AC3E}">
-        <p14:creationId xmlns:p14="http://schemas.microsoft.com/office/powerpoint/2010/main" val="2598923651"/>
+        <p14:creationId xmlns:p14="http://schemas.microsoft.com/office/powerpoint/2010/main" xmlns="" val="2598923651"/>
       </p:ext>
     </p:extLst>
   </p:cSld>
@@ -2451,10 +2464,10 @@
           <p:nvPr/>
         </p:nvPicPr>
         <p:blipFill>
-          <a:blip r:embed="rId2">
+          <a:blip r:embed="rId2" cstate="print">
             <a:extLst>
               <a:ext uri="{28A0092B-C50C-407E-A947-70E740481C1C}">
-                <a14:useLocalDpi xmlns:a14="http://schemas.microsoft.com/office/drawing/2010/main" val="0"/>
+                <a14:useLocalDpi xmlns:a14="http://schemas.microsoft.com/office/drawing/2010/main" xmlns="" val="0"/>
               </a:ext>
             </a:extLst>
           </a:blip>
@@ -2691,6 +2704,7 @@
           <a:p>
             <a:fld id="{82DAD41B-C870-4CF8-92A7-5C3761120322}" type="datetimeFigureOut">
               <a:rPr lang="en-GB" smtClean="0"/>
+              <a:pPr/>
               <a:t>03/04/2016</a:t>
             </a:fld>
             <a:endParaRPr lang="en-GB"/>
@@ -2733,6 +2747,7 @@
           <a:p>
             <a:fld id="{3F7F1F27-6BB8-4210-BD7D-83487C4A09E4}" type="slidenum">
               <a:rPr lang="en-GB" smtClean="0"/>
+              <a:pPr/>
               <a:t>‹#›</a:t>
             </a:fld>
             <a:endParaRPr lang="en-GB"/>
@@ -2742,7 +2757,7 @@
     </p:spTree>
     <p:extLst>
       <p:ext uri="{BB962C8B-B14F-4D97-AF65-F5344CB8AC3E}">
-        <p14:creationId xmlns:p14="http://schemas.microsoft.com/office/powerpoint/2010/main" val="4234986026"/>
+        <p14:creationId xmlns:p14="http://schemas.microsoft.com/office/powerpoint/2010/main" xmlns="" val="4234986026"/>
       </p:ext>
     </p:extLst>
   </p:cSld>
@@ -2778,10 +2793,10 @@
           <p:nvPr/>
         </p:nvPicPr>
         <p:blipFill>
-          <a:blip r:embed="rId2">
+          <a:blip r:embed="rId2" cstate="print">
             <a:extLst>
               <a:ext uri="{28A0092B-C50C-407E-A947-70E740481C1C}">
-                <a14:useLocalDpi xmlns:a14="http://schemas.microsoft.com/office/drawing/2010/main" val="0"/>
+                <a14:useLocalDpi xmlns:a14="http://schemas.microsoft.com/office/drawing/2010/main" xmlns="" val="0"/>
               </a:ext>
             </a:extLst>
           </a:blip>
@@ -2868,6 +2883,7 @@
           <a:p>
             <a:fld id="{82DAD41B-C870-4CF8-92A7-5C3761120322}" type="datetimeFigureOut">
               <a:rPr lang="en-GB" smtClean="0"/>
+              <a:pPr/>
               <a:t>03/04/2016</a:t>
             </a:fld>
             <a:endParaRPr lang="en-GB"/>
@@ -2910,6 +2926,7 @@
           <a:p>
             <a:fld id="{3F7F1F27-6BB8-4210-BD7D-83487C4A09E4}" type="slidenum">
               <a:rPr lang="en-GB" smtClean="0"/>
+              <a:pPr/>
               <a:t>‹#›</a:t>
             </a:fld>
             <a:endParaRPr lang="en-GB"/>
@@ -2947,7 +2964,7 @@
     </p:spTree>
     <p:extLst>
       <p:ext uri="{BB962C8B-B14F-4D97-AF65-F5344CB8AC3E}">
-        <p14:creationId xmlns:p14="http://schemas.microsoft.com/office/powerpoint/2010/main" val="2491833819"/>
+        <p14:creationId xmlns:p14="http://schemas.microsoft.com/office/powerpoint/2010/main" xmlns="" val="2491833819"/>
       </p:ext>
     </p:extLst>
   </p:cSld>
@@ -2983,10 +3000,10 @@
           <p:nvPr/>
         </p:nvPicPr>
         <p:blipFill>
-          <a:blip r:embed="rId2">
+          <a:blip r:embed="rId2" cstate="print">
             <a:extLst>
               <a:ext uri="{28A0092B-C50C-407E-A947-70E740481C1C}">
-                <a14:useLocalDpi xmlns:a14="http://schemas.microsoft.com/office/drawing/2010/main" val="0"/>
+                <a14:useLocalDpi xmlns:a14="http://schemas.microsoft.com/office/drawing/2010/main" xmlns="" val="0"/>
               </a:ext>
             </a:extLst>
           </a:blip>
@@ -3106,6 +3123,7 @@
           <a:p>
             <a:fld id="{82DAD41B-C870-4CF8-92A7-5C3761120322}" type="datetimeFigureOut">
               <a:rPr lang="en-GB" smtClean="0"/>
+              <a:pPr/>
               <a:t>03/04/2016</a:t>
             </a:fld>
             <a:endParaRPr lang="en-GB"/>
@@ -3148,6 +3166,7 @@
           <a:p>
             <a:fld id="{3F7F1F27-6BB8-4210-BD7D-83487C4A09E4}" type="slidenum">
               <a:rPr lang="en-GB" smtClean="0"/>
+              <a:pPr/>
               <a:t>‹#›</a:t>
             </a:fld>
             <a:endParaRPr lang="en-GB"/>
@@ -3157,7 +3176,7 @@
     </p:spTree>
     <p:extLst>
       <p:ext uri="{BB962C8B-B14F-4D97-AF65-F5344CB8AC3E}">
-        <p14:creationId xmlns:p14="http://schemas.microsoft.com/office/powerpoint/2010/main" val="1252998571"/>
+        <p14:creationId xmlns:p14="http://schemas.microsoft.com/office/powerpoint/2010/main" xmlns="" val="1252998571"/>
       </p:ext>
     </p:extLst>
   </p:cSld>
@@ -3193,10 +3212,10 @@
           <p:nvPr/>
         </p:nvPicPr>
         <p:blipFill>
-          <a:blip r:embed="rId2">
+          <a:blip r:embed="rId2" cstate="print">
             <a:extLst>
               <a:ext uri="{28A0092B-C50C-407E-A947-70E740481C1C}">
-                <a14:useLocalDpi xmlns:a14="http://schemas.microsoft.com/office/drawing/2010/main" val="0"/>
+                <a14:useLocalDpi xmlns:a14="http://schemas.microsoft.com/office/drawing/2010/main" xmlns="" val="0"/>
               </a:ext>
             </a:extLst>
           </a:blip>
@@ -3306,6 +3325,7 @@
           <a:p>
             <a:fld id="{82DAD41B-C870-4CF8-92A7-5C3761120322}" type="datetimeFigureOut">
               <a:rPr lang="en-GB" smtClean="0"/>
+              <a:pPr/>
               <a:t>03/04/2016</a:t>
             </a:fld>
             <a:endParaRPr lang="en-GB"/>
@@ -3348,6 +3368,7 @@
           <a:p>
             <a:fld id="{3F7F1F27-6BB8-4210-BD7D-83487C4A09E4}" type="slidenum">
               <a:rPr lang="en-GB" smtClean="0"/>
+              <a:pPr/>
               <a:t>‹#›</a:t>
             </a:fld>
             <a:endParaRPr lang="en-GB"/>
@@ -3357,7 +3378,7 @@
     </p:spTree>
     <p:extLst>
       <p:ext uri="{BB962C8B-B14F-4D97-AF65-F5344CB8AC3E}">
-        <p14:creationId xmlns:p14="http://schemas.microsoft.com/office/powerpoint/2010/main" val="3246475545"/>
+        <p14:creationId xmlns:p14="http://schemas.microsoft.com/office/powerpoint/2010/main" xmlns="" val="3246475545"/>
       </p:ext>
     </p:extLst>
   </p:cSld>
@@ -3393,10 +3414,10 @@
           <p:nvPr/>
         </p:nvPicPr>
         <p:blipFill>
-          <a:blip r:embed="rId2">
+          <a:blip r:embed="rId2" cstate="print">
             <a:extLst>
               <a:ext uri="{28A0092B-C50C-407E-A947-70E740481C1C}">
-                <a14:useLocalDpi xmlns:a14="http://schemas.microsoft.com/office/drawing/2010/main" val="0"/>
+                <a14:useLocalDpi xmlns:a14="http://schemas.microsoft.com/office/drawing/2010/main" xmlns="" val="0"/>
               </a:ext>
             </a:extLst>
           </a:blip>
@@ -3582,6 +3603,7 @@
           <a:p>
             <a:fld id="{82DAD41B-C870-4CF8-92A7-5C3761120322}" type="datetimeFigureOut">
               <a:rPr lang="en-GB" smtClean="0"/>
+              <a:pPr/>
               <a:t>03/04/2016</a:t>
             </a:fld>
             <a:endParaRPr lang="en-GB"/>
@@ -3624,6 +3646,7 @@
           <a:p>
             <a:fld id="{3F7F1F27-6BB8-4210-BD7D-83487C4A09E4}" type="slidenum">
               <a:rPr lang="en-GB" smtClean="0"/>
+              <a:pPr/>
               <a:t>‹#›</a:t>
             </a:fld>
             <a:endParaRPr lang="en-GB"/>
@@ -3633,7 +3656,7 @@
     </p:spTree>
     <p:extLst>
       <p:ext uri="{BB962C8B-B14F-4D97-AF65-F5344CB8AC3E}">
-        <p14:creationId xmlns:p14="http://schemas.microsoft.com/office/powerpoint/2010/main" val="1051195976"/>
+        <p14:creationId xmlns:p14="http://schemas.microsoft.com/office/powerpoint/2010/main" xmlns="" val="1051195976"/>
       </p:ext>
     </p:extLst>
   </p:cSld>
@@ -3669,10 +3692,10 @@
           <p:nvPr/>
         </p:nvPicPr>
         <p:blipFill>
-          <a:blip r:embed="rId2">
+          <a:blip r:embed="rId2" cstate="print">
             <a:extLst>
               <a:ext uri="{28A0092B-C50C-407E-A947-70E740481C1C}">
-                <a14:useLocalDpi xmlns:a14="http://schemas.microsoft.com/office/drawing/2010/main" val="0"/>
+                <a14:useLocalDpi xmlns:a14="http://schemas.microsoft.com/office/drawing/2010/main" xmlns="" val="0"/>
               </a:ext>
             </a:extLst>
           </a:blip>
@@ -3848,6 +3871,7 @@
           <a:p>
             <a:fld id="{82DAD41B-C870-4CF8-92A7-5C3761120322}" type="datetimeFigureOut">
               <a:rPr lang="en-GB" smtClean="0"/>
+              <a:pPr/>
               <a:t>03/04/2016</a:t>
             </a:fld>
             <a:endParaRPr lang="en-GB"/>
@@ -3890,6 +3914,7 @@
           <a:p>
             <a:fld id="{3F7F1F27-6BB8-4210-BD7D-83487C4A09E4}" type="slidenum">
               <a:rPr lang="en-GB" smtClean="0"/>
+              <a:pPr/>
               <a:t>‹#›</a:t>
             </a:fld>
             <a:endParaRPr lang="en-GB"/>
@@ -3899,7 +3924,7 @@
     </p:spTree>
     <p:extLst>
       <p:ext uri="{BB962C8B-B14F-4D97-AF65-F5344CB8AC3E}">
-        <p14:creationId xmlns:p14="http://schemas.microsoft.com/office/powerpoint/2010/main" val="3615173209"/>
+        <p14:creationId xmlns:p14="http://schemas.microsoft.com/office/powerpoint/2010/main" xmlns="" val="3615173209"/>
       </p:ext>
     </p:extLst>
   </p:cSld>
@@ -4222,6 +4247,7 @@
           <a:p>
             <a:fld id="{82DAD41B-C870-4CF8-92A7-5C3761120322}" type="datetimeFigureOut">
               <a:rPr lang="en-GB" smtClean="0"/>
+              <a:pPr/>
               <a:t>03/04/2016</a:t>
             </a:fld>
             <a:endParaRPr lang="en-GB"/>
@@ -4264,6 +4290,7 @@
           <a:p>
             <a:fld id="{3F7F1F27-6BB8-4210-BD7D-83487C4A09E4}" type="slidenum">
               <a:rPr lang="en-GB" smtClean="0"/>
+              <a:pPr/>
               <a:t>‹#›</a:t>
             </a:fld>
             <a:endParaRPr lang="en-GB"/>
@@ -4273,7 +4300,7 @@
     </p:spTree>
     <p:extLst>
       <p:ext uri="{BB962C8B-B14F-4D97-AF65-F5344CB8AC3E}">
-        <p14:creationId xmlns:p14="http://schemas.microsoft.com/office/powerpoint/2010/main" val="2714827477"/>
+        <p14:creationId xmlns:p14="http://schemas.microsoft.com/office/powerpoint/2010/main" xmlns="" val="2714827477"/>
       </p:ext>
     </p:extLst>
   </p:cSld>
@@ -4309,10 +4336,10 @@
           <p:nvPr/>
         </p:nvPicPr>
         <p:blipFill>
-          <a:blip r:embed="rId2">
+          <a:blip r:embed="rId2" cstate="print">
             <a:extLst>
               <a:ext uri="{28A0092B-C50C-407E-A947-70E740481C1C}">
-                <a14:useLocalDpi xmlns:a14="http://schemas.microsoft.com/office/drawing/2010/main" val="0"/>
+                <a14:useLocalDpi xmlns:a14="http://schemas.microsoft.com/office/drawing/2010/main" xmlns="" val="0"/>
               </a:ext>
             </a:extLst>
           </a:blip>
@@ -4370,6 +4397,7 @@
           <a:p>
             <a:fld id="{82DAD41B-C870-4CF8-92A7-5C3761120322}" type="datetimeFigureOut">
               <a:rPr lang="en-GB" smtClean="0"/>
+              <a:pPr/>
               <a:t>03/04/2016</a:t>
             </a:fld>
             <a:endParaRPr lang="en-GB"/>
@@ -4412,6 +4440,7 @@
           <a:p>
             <a:fld id="{3F7F1F27-6BB8-4210-BD7D-83487C4A09E4}" type="slidenum">
               <a:rPr lang="en-GB" smtClean="0"/>
+              <a:pPr/>
               <a:t>‹#›</a:t>
             </a:fld>
             <a:endParaRPr lang="en-GB"/>
@@ -4421,7 +4450,7 @@
     </p:spTree>
     <p:extLst>
       <p:ext uri="{BB962C8B-B14F-4D97-AF65-F5344CB8AC3E}">
-        <p14:creationId xmlns:p14="http://schemas.microsoft.com/office/powerpoint/2010/main" val="2169993803"/>
+        <p14:creationId xmlns:p14="http://schemas.microsoft.com/office/powerpoint/2010/main" xmlns="" val="2169993803"/>
       </p:ext>
     </p:extLst>
   </p:cSld>
@@ -4457,10 +4486,10 @@
           <p:nvPr/>
         </p:nvPicPr>
         <p:blipFill>
-          <a:blip r:embed="rId2">
+          <a:blip r:embed="rId2" cstate="print">
             <a:extLst>
               <a:ext uri="{28A0092B-C50C-407E-A947-70E740481C1C}">
-                <a14:useLocalDpi xmlns:a14="http://schemas.microsoft.com/office/drawing/2010/main" val="0"/>
+                <a14:useLocalDpi xmlns:a14="http://schemas.microsoft.com/office/drawing/2010/main" xmlns="" val="0"/>
               </a:ext>
             </a:extLst>
           </a:blip>
@@ -4495,6 +4524,7 @@
           <a:p>
             <a:fld id="{82DAD41B-C870-4CF8-92A7-5C3761120322}" type="datetimeFigureOut">
               <a:rPr lang="en-GB" smtClean="0"/>
+              <a:pPr/>
               <a:t>03/04/2016</a:t>
             </a:fld>
             <a:endParaRPr lang="en-GB"/>
@@ -4537,6 +4567,7 @@
           <a:p>
             <a:fld id="{3F7F1F27-6BB8-4210-BD7D-83487C4A09E4}" type="slidenum">
               <a:rPr lang="en-GB" smtClean="0"/>
+              <a:pPr/>
               <a:t>‹#›</a:t>
             </a:fld>
             <a:endParaRPr lang="en-GB"/>
@@ -4546,7 +4577,7 @@
     </p:spTree>
     <p:extLst>
       <p:ext uri="{BB962C8B-B14F-4D97-AF65-F5344CB8AC3E}">
-        <p14:creationId xmlns:p14="http://schemas.microsoft.com/office/powerpoint/2010/main" val="426167131"/>
+        <p14:creationId xmlns:p14="http://schemas.microsoft.com/office/powerpoint/2010/main" xmlns="" val="426167131"/>
       </p:ext>
     </p:extLst>
   </p:cSld>
@@ -4582,10 +4613,10 @@
           <p:nvPr/>
         </p:nvPicPr>
         <p:blipFill>
-          <a:blip r:embed="rId2">
+          <a:blip r:embed="rId2" cstate="print">
             <a:extLst>
               <a:ext uri="{28A0092B-C50C-407E-A947-70E740481C1C}">
-                <a14:useLocalDpi xmlns:a14="http://schemas.microsoft.com/office/drawing/2010/main" val="0"/>
+                <a14:useLocalDpi xmlns:a14="http://schemas.microsoft.com/office/drawing/2010/main" xmlns="" val="0"/>
               </a:ext>
             </a:extLst>
           </a:blip>
@@ -4780,6 +4811,7 @@
           <a:p>
             <a:fld id="{82DAD41B-C870-4CF8-92A7-5C3761120322}" type="datetimeFigureOut">
               <a:rPr lang="en-GB" smtClean="0"/>
+              <a:pPr/>
               <a:t>03/04/2016</a:t>
             </a:fld>
             <a:endParaRPr lang="en-GB"/>
@@ -4822,6 +4854,7 @@
           <a:p>
             <a:fld id="{3F7F1F27-6BB8-4210-BD7D-83487C4A09E4}" type="slidenum">
               <a:rPr lang="en-GB" smtClean="0"/>
+              <a:pPr/>
               <a:t>‹#›</a:t>
             </a:fld>
             <a:endParaRPr lang="en-GB"/>
@@ -4831,7 +4864,7 @@
     </p:spTree>
     <p:extLst>
       <p:ext uri="{BB962C8B-B14F-4D97-AF65-F5344CB8AC3E}">
-        <p14:creationId xmlns:p14="http://schemas.microsoft.com/office/powerpoint/2010/main" val="3151392446"/>
+        <p14:creationId xmlns:p14="http://schemas.microsoft.com/office/powerpoint/2010/main" xmlns="" val="3151392446"/>
       </p:ext>
     </p:extLst>
   </p:cSld>
@@ -4867,10 +4900,10 @@
           <p:nvPr/>
         </p:nvPicPr>
         <p:blipFill>
-          <a:blip r:embed="rId2">
+          <a:blip r:embed="rId2" cstate="print">
             <a:extLst>
               <a:ext uri="{28A0092B-C50C-407E-A947-70E740481C1C}">
-                <a14:useLocalDpi xmlns:a14="http://schemas.microsoft.com/office/drawing/2010/main" val="0"/>
+                <a14:useLocalDpi xmlns:a14="http://schemas.microsoft.com/office/drawing/2010/main" xmlns="" val="0"/>
               </a:ext>
             </a:extLst>
           </a:blip>
@@ -5104,6 +5137,7 @@
           <a:p>
             <a:fld id="{82DAD41B-C870-4CF8-92A7-5C3761120322}" type="datetimeFigureOut">
               <a:rPr lang="en-GB" smtClean="0"/>
+              <a:pPr/>
               <a:t>03/04/2016</a:t>
             </a:fld>
             <a:endParaRPr lang="en-GB"/>
@@ -5146,6 +5180,7 @@
           <a:p>
             <a:fld id="{3F7F1F27-6BB8-4210-BD7D-83487C4A09E4}" type="slidenum">
               <a:rPr lang="en-GB" smtClean="0"/>
+              <a:pPr/>
               <a:t>‹#›</a:t>
             </a:fld>
             <a:endParaRPr lang="en-GB"/>
@@ -5155,7 +5190,7 @@
     </p:spTree>
     <p:extLst>
       <p:ext uri="{BB962C8B-B14F-4D97-AF65-F5344CB8AC3E}">
-        <p14:creationId xmlns:p14="http://schemas.microsoft.com/office/powerpoint/2010/main" val="3741149531"/>
+        <p14:creationId xmlns:p14="http://schemas.microsoft.com/office/powerpoint/2010/main" xmlns="" val="3741149531"/>
       </p:ext>
     </p:extLst>
   </p:cSld>
@@ -5318,6 +5353,7 @@
           <a:p>
             <a:fld id="{82DAD41B-C870-4CF8-92A7-5C3761120322}" type="datetimeFigureOut">
               <a:rPr lang="en-GB" smtClean="0"/>
+              <a:pPr/>
               <a:t>03/04/2016</a:t>
             </a:fld>
             <a:endParaRPr lang="en-GB"/>
@@ -5396,6 +5432,7 @@
           <a:p>
             <a:fld id="{3F7F1F27-6BB8-4210-BD7D-83487C4A09E4}" type="slidenum">
               <a:rPr lang="en-GB" smtClean="0"/>
+              <a:pPr/>
               <a:t>‹#›</a:t>
             </a:fld>
             <a:endParaRPr lang="en-GB"/>
@@ -5405,7 +5442,7 @@
     </p:spTree>
     <p:extLst>
       <p:ext uri="{BB962C8B-B14F-4D97-AF65-F5344CB8AC3E}">
-        <p14:creationId xmlns:p14="http://schemas.microsoft.com/office/powerpoint/2010/main" val="2941518341"/>
+        <p14:creationId xmlns:p14="http://schemas.microsoft.com/office/powerpoint/2010/main" xmlns="" val="2941518341"/>
       </p:ext>
     </p:extLst>
   </p:cSld>
@@ -5849,8 +5886,14 @@
           <a:lstStyle/>
           <a:p>
             <a:r>
+              <a:rPr lang="tr-TR" b="1" dirty="0">
+                <a:latin typeface="Arial Black" pitchFamily="34" charset="0"/>
+              </a:rPr>
+              <a:t>ROCKET FOOL</a:t>
+            </a:r>
+            <a:r>
               <a:rPr lang="tr-TR" dirty="0"/>
-              <a:t>ROCKET FOOL</a:t>
+              <a:t/>
             </a:r>
             <a:br>
               <a:rPr lang="tr-TR" dirty="0"/>
@@ -5859,6 +5902,10 @@
               <a:rPr lang="tr-TR" dirty="0" err="1"/>
               <a:t>by</a:t>
             </a:r>
+            <a:r>
+              <a:rPr lang="tr-TR" dirty="0"/>
+              <a:t/>
+            </a:r>
             <a:br>
               <a:rPr lang="tr-TR" dirty="0"/>
             </a:br>
@@ -5896,7 +5943,416 @@
     </p:spTree>
     <p:extLst>
       <p:ext uri="{BB962C8B-B14F-4D97-AF65-F5344CB8AC3E}">
-        <p14:creationId xmlns:p14="http://schemas.microsoft.com/office/powerpoint/2010/main" val="1044021024"/>
+        <p14:creationId xmlns:p14="http://schemas.microsoft.com/office/powerpoint/2010/main" xmlns="" val="1044021024"/>
+      </p:ext>
+    </p:extLst>
+  </p:cSld>
+  <p:clrMapOvr>
+    <a:masterClrMapping/>
+  </p:clrMapOvr>
+</p:sld>
+</file>
+
+<file path=ppt/slides/slide10.xml><?xml version="1.0" encoding="utf-8"?>
+<p:sld xmlns:a="http://schemas.openxmlformats.org/drawingml/2006/main" xmlns:r="http://schemas.openxmlformats.org/officeDocument/2006/relationships" xmlns:p="http://schemas.openxmlformats.org/presentationml/2006/main">
+  <p:cSld>
+    <p:spTree>
+      <p:nvGrpSpPr>
+        <p:cNvPr id="1" name=""/>
+        <p:cNvGrpSpPr/>
+        <p:nvPr/>
+      </p:nvGrpSpPr>
+      <p:grpSpPr>
+        <a:xfrm>
+          <a:off x="0" y="0"/>
+          <a:ext cx="0" cy="0"/>
+          <a:chOff x="0" y="0"/>
+          <a:chExt cx="0" cy="0"/>
+        </a:xfrm>
+      </p:grpSpPr>
+      <p:sp>
+        <p:nvSpPr>
+          <p:cNvPr id="2" name="Title 1"/>
+          <p:cNvSpPr>
+            <a:spLocks noGrp="1"/>
+          </p:cNvSpPr>
+          <p:nvPr>
+            <p:ph type="title"/>
+          </p:nvPr>
+        </p:nvSpPr>
+        <p:spPr>
+          <a:xfrm>
+            <a:off x="685801" y="609600"/>
+            <a:ext cx="3919653" cy="1297259"/>
+          </a:xfrm>
+        </p:spPr>
+        <p:txBody>
+          <a:bodyPr/>
+          <a:lstStyle/>
+          <a:p>
+            <a:r>
+              <a:rPr lang="en-GB" dirty="0"/>
+              <a:t>Task Assignment</a:t>
+            </a:r>
+            <a:br>
+              <a:rPr lang="en-GB" dirty="0"/>
+            </a:br>
+            <a:endParaRPr lang="en-GB" dirty="0"/>
+          </a:p>
+        </p:txBody>
+      </p:sp>
+      <p:sp>
+        <p:nvSpPr>
+          <p:cNvPr id="3" name="Content Placeholder 2"/>
+          <p:cNvSpPr>
+            <a:spLocks noGrp="1"/>
+          </p:cNvSpPr>
+          <p:nvPr>
+            <p:ph idx="1"/>
+          </p:nvPr>
+        </p:nvSpPr>
+        <p:spPr>
+          <a:xfrm>
+            <a:off x="473929" y="2379102"/>
+            <a:ext cx="7153506" cy="3489299"/>
+          </a:xfrm>
+        </p:spPr>
+        <p:txBody>
+          <a:bodyPr>
+            <a:normAutofit fontScale="25000" lnSpcReduction="20000"/>
+          </a:bodyPr>
+          <a:lstStyle/>
+          <a:p>
+            <a:pPr marL="457200" lvl="1" indent="0">
+              <a:buNone/>
+            </a:pPr>
+            <a:r>
+              <a:rPr lang="en-GB" sz="7000" dirty="0"/>
+              <a:t>Ömer</a:t>
+            </a:r>
+            <a:r>
+              <a:rPr lang="tr-TR" sz="7000" dirty="0"/>
+              <a:t>:</a:t>
+            </a:r>
+            <a:endParaRPr lang="en-GB" sz="7000" dirty="0"/>
+          </a:p>
+          <a:p>
+            <a:r>
+              <a:rPr lang="en-GB" sz="7200" dirty="0"/>
+              <a:t>	In-Game screen GUI (some parts)</a:t>
+            </a:r>
+          </a:p>
+          <a:p>
+            <a:r>
+              <a:rPr lang="en-GB" sz="7200" dirty="0"/>
+              <a:t>	Scenario and script preparation</a:t>
+            </a:r>
+            <a:endParaRPr lang="tr-TR" sz="7200" dirty="0"/>
+          </a:p>
+          <a:p>
+            <a:endParaRPr lang="en-GB" sz="7200" dirty="0"/>
+          </a:p>
+          <a:p>
+            <a:pPr marL="0" indent="0">
+              <a:buNone/>
+            </a:pPr>
+            <a:r>
+              <a:rPr lang="en-GB" sz="7200" dirty="0"/>
+              <a:t>	Alperen</a:t>
+            </a:r>
+            <a:r>
+              <a:rPr lang="tr-TR" sz="7200" dirty="0"/>
+              <a:t>:</a:t>
+            </a:r>
+            <a:endParaRPr lang="en-GB" sz="7200" dirty="0"/>
+          </a:p>
+          <a:p>
+            <a:r>
+              <a:rPr lang="en-GB" sz="7200" dirty="0"/>
+              <a:t>	Menu screens’ classes and GUI</a:t>
+            </a:r>
+          </a:p>
+          <a:p>
+            <a:r>
+              <a:rPr lang="en-GB" sz="7200" dirty="0"/>
+              <a:t>	Animations and graphics</a:t>
+            </a:r>
+          </a:p>
+          <a:p>
+            <a:r>
+              <a:rPr lang="en-GB" sz="7200" dirty="0"/>
+              <a:t>	</a:t>
+            </a:r>
+            <a:r>
+              <a:rPr lang="en-GB" sz="7200" dirty="0" err="1"/>
+              <a:t>Cutscenes</a:t>
+            </a:r>
+            <a:r>
+              <a:rPr lang="en-GB" sz="7200" dirty="0"/>
+              <a:t> </a:t>
+            </a:r>
+          </a:p>
+          <a:p>
+            <a:r>
+              <a:rPr lang="en-GB" sz="7200" dirty="0"/>
+              <a:t>	Sounds </a:t>
+            </a:r>
+          </a:p>
+          <a:p>
+            <a:pPr marL="0" indent="0">
+              <a:buNone/>
+            </a:pPr>
+            <a:endParaRPr lang="tr-TR" sz="7200" dirty="0"/>
+          </a:p>
+          <a:p>
+            <a:pPr marL="0" indent="0">
+              <a:buNone/>
+            </a:pPr>
+            <a:r>
+              <a:rPr lang="en-GB" sz="7200" dirty="0"/>
+              <a:t>	Levent</a:t>
+            </a:r>
+            <a:r>
+              <a:rPr lang="tr-TR" sz="7200" dirty="0"/>
+              <a:t>:</a:t>
+            </a:r>
+            <a:endParaRPr lang="en-GB" sz="7200" dirty="0"/>
+          </a:p>
+          <a:p>
+            <a:r>
+              <a:rPr lang="en-GB" sz="7200" dirty="0"/>
+              <a:t>	</a:t>
+            </a:r>
+            <a:r>
+              <a:rPr lang="en-GB" sz="7200" dirty="0" err="1"/>
+              <a:t>SaveState</a:t>
+            </a:r>
+            <a:r>
+              <a:rPr lang="en-GB" sz="7200" dirty="0"/>
+              <a:t> class</a:t>
+            </a:r>
+          </a:p>
+          <a:p>
+            <a:r>
+              <a:rPr lang="en-GB" sz="7200" dirty="0"/>
+              <a:t>	Level class (some of the methods)</a:t>
+            </a:r>
+          </a:p>
+          <a:p>
+            <a:r>
+              <a:rPr lang="en-GB" sz="7200" dirty="0"/>
+              <a:t>	Learning content preparation</a:t>
+            </a:r>
+          </a:p>
+          <a:p>
+            <a:endParaRPr lang="en-GB" dirty="0"/>
+          </a:p>
+        </p:txBody>
+      </p:sp>
+      <p:sp>
+        <p:nvSpPr>
+          <p:cNvPr id="4" name="TextBox 3"/>
+          <p:cNvSpPr txBox="1"/>
+          <p:nvPr/>
+        </p:nvSpPr>
+        <p:spPr>
+          <a:xfrm>
+            <a:off x="6322743" y="609600"/>
+            <a:ext cx="5999356" cy="7294305"/>
+          </a:xfrm>
+          <a:prstGeom prst="rect">
+            <a:avLst/>
+          </a:prstGeom>
+          <a:noFill/>
+        </p:spPr>
+        <p:txBody>
+          <a:bodyPr wrap="square" rtlCol="0">
+            <a:spAutoFit/>
+          </a:bodyPr>
+          <a:lstStyle/>
+          <a:p>
+            <a:r>
+              <a:rPr lang="tr-TR" dirty="0"/>
+              <a:t>	</a:t>
+            </a:r>
+            <a:r>
+              <a:rPr lang="en-GB" dirty="0"/>
+              <a:t>Hakan</a:t>
+            </a:r>
+            <a:r>
+              <a:rPr lang="tr-TR" dirty="0"/>
+              <a:t>:</a:t>
+            </a:r>
+            <a:endParaRPr lang="en-GB" dirty="0"/>
+          </a:p>
+          <a:p>
+            <a:r>
+              <a:rPr lang="en-GB" dirty="0"/>
+              <a:t>•	Playable class</a:t>
+            </a:r>
+          </a:p>
+          <a:p>
+            <a:r>
+              <a:rPr lang="en-GB" dirty="0"/>
+              <a:t>•	</a:t>
+            </a:r>
+            <a:r>
+              <a:rPr lang="en-GB" dirty="0" err="1"/>
+              <a:t>GameObject</a:t>
+            </a:r>
+            <a:r>
+              <a:rPr lang="en-GB" dirty="0"/>
+              <a:t> and </a:t>
+            </a:r>
+            <a:r>
+              <a:rPr lang="en-GB" dirty="0" err="1"/>
+              <a:t>SolidObject</a:t>
+            </a:r>
+            <a:r>
+              <a:rPr lang="en-GB" dirty="0"/>
+              <a:t> classes</a:t>
+            </a:r>
+          </a:p>
+          <a:p>
+            <a:r>
+              <a:rPr lang="en-GB" dirty="0"/>
+              <a:t>•	Celestial Body class and subclasses</a:t>
+            </a:r>
+          </a:p>
+          <a:p>
+            <a:r>
+              <a:rPr lang="en-GB" dirty="0"/>
+              <a:t>•	Level class (most of it)</a:t>
+            </a:r>
+          </a:p>
+          <a:p>
+            <a:r>
+              <a:rPr lang="en-GB" dirty="0"/>
+              <a:t>•	Control classes</a:t>
+            </a:r>
+          </a:p>
+          <a:p>
+            <a:r>
+              <a:rPr lang="en-GB" dirty="0"/>
+              <a:t>•	Camera/viewpoint classes</a:t>
+            </a:r>
+            <a:endParaRPr lang="tr-TR" dirty="0"/>
+          </a:p>
+          <a:p>
+            <a:endParaRPr lang="tr-TR" dirty="0"/>
+          </a:p>
+          <a:p>
+            <a:r>
+              <a:rPr lang="en-GB" dirty="0"/>
+              <a:t>	Yaman</a:t>
+            </a:r>
+            <a:r>
+              <a:rPr lang="tr-TR" dirty="0"/>
+              <a:t>:</a:t>
+            </a:r>
+            <a:endParaRPr lang="en-GB" dirty="0"/>
+          </a:p>
+          <a:p>
+            <a:r>
+              <a:rPr lang="en-GB" dirty="0"/>
+              <a:t>•	In-Game screen GUI (some parts)</a:t>
+            </a:r>
+          </a:p>
+          <a:p>
+            <a:r>
+              <a:rPr lang="en-GB" dirty="0"/>
+              <a:t>•	Map class</a:t>
+            </a:r>
+          </a:p>
+          <a:p>
+            <a:r>
+              <a:rPr lang="en-GB" dirty="0"/>
+              <a:t>•	Obstacle classes</a:t>
+            </a:r>
+          </a:p>
+          <a:p>
+            <a:r>
+              <a:rPr lang="en-GB" dirty="0"/>
+              <a:t>•	Waypoint class</a:t>
+            </a:r>
+          </a:p>
+          <a:p>
+            <a:r>
+              <a:rPr lang="en-GB" dirty="0"/>
+              <a:t>•	Trigger classes</a:t>
+            </a:r>
+          </a:p>
+          <a:p>
+            <a:endParaRPr lang="tr-TR" dirty="0"/>
+          </a:p>
+          <a:p>
+            <a:r>
+              <a:rPr lang="en-GB" dirty="0"/>
+              <a:t>	All group members</a:t>
+            </a:r>
+            <a:r>
+              <a:rPr lang="tr-TR" dirty="0"/>
+              <a:t>:</a:t>
+            </a:r>
+            <a:endParaRPr lang="en-GB" dirty="0"/>
+          </a:p>
+          <a:p>
+            <a:r>
+              <a:rPr lang="en-GB" dirty="0"/>
+              <a:t>•	Level design and coding</a:t>
+            </a:r>
+          </a:p>
+          <a:p>
+            <a:r>
+              <a:rPr lang="en-GB" dirty="0"/>
+              <a:t>•	Debugging</a:t>
+            </a:r>
+          </a:p>
+          <a:p>
+            <a:r>
+              <a:rPr lang="en-GB" dirty="0"/>
+              <a:t>•	Balancing</a:t>
+            </a:r>
+          </a:p>
+          <a:p>
+            <a:r>
+              <a:rPr lang="en-GB" dirty="0"/>
+              <a:t>•	Playtesting and reflecting</a:t>
+            </a:r>
+          </a:p>
+          <a:p>
+            <a:r>
+              <a:rPr lang="en-GB" dirty="0"/>
+              <a:t>•	Collecting assets, such as illustrations for dialog boxes or </a:t>
+            </a:r>
+            <a:r>
+              <a:rPr lang="tr-TR" dirty="0"/>
+              <a:t>	</a:t>
+            </a:r>
+            <a:r>
+              <a:rPr lang="en-GB" dirty="0"/>
+              <a:t>music</a:t>
+            </a:r>
+            <a:endParaRPr lang="tr-TR" dirty="0"/>
+          </a:p>
+          <a:p>
+            <a:endParaRPr lang="tr-TR" dirty="0"/>
+          </a:p>
+          <a:p>
+            <a:r>
+              <a:rPr lang="en-GB" dirty="0"/>
+              <a:t>.</a:t>
+            </a:r>
+          </a:p>
+          <a:p>
+            <a:endParaRPr lang="en-GB" dirty="0"/>
+          </a:p>
+        </p:txBody>
+      </p:sp>
+    </p:spTree>
+    <p:extLst>
+      <p:ext uri="{BB962C8B-B14F-4D97-AF65-F5344CB8AC3E}">
+        <p14:creationId xmlns:p14="http://schemas.microsoft.com/office/powerpoint/2010/main" xmlns="" val="3618809772"/>
       </p:ext>
     </p:extLst>
   </p:cSld>
@@ -5939,20 +6395,24 @@
           <a:lstStyle/>
           <a:p>
             <a:r>
-              <a:rPr lang="tr-TR" dirty="0"/>
-              <a:t>24 </a:t>
-            </a:r>
-            <a:r>
-              <a:rPr lang="tr-TR" dirty="0" err="1"/>
-              <a:t>Hours</a:t>
-            </a:r>
-            <a:r>
-              <a:rPr lang="tr-TR" dirty="0"/>
-              <a:t> </a:t>
-            </a:r>
-            <a:r>
-              <a:rPr lang="tr-TR" dirty="0" err="1"/>
-              <a:t>transformatıon</a:t>
+              <a:rPr lang="tr-TR" dirty="0" smtClean="0"/>
+              <a:t>24</a:t>
+            </a:r>
+            <a:r>
+              <a:rPr lang="en-US" dirty="0" smtClean="0"/>
+              <a:t>-</a:t>
+            </a:r>
+            <a:r>
+              <a:rPr lang="tr-TR" dirty="0" smtClean="0"/>
+              <a:t>Hour transformat</a:t>
+            </a:r>
+            <a:r>
+              <a:rPr lang="en-US" dirty="0" smtClean="0"/>
+              <a:t>I</a:t>
+            </a:r>
+            <a:r>
+              <a:rPr lang="tr-TR" dirty="0" smtClean="0"/>
+              <a:t>on</a:t>
             </a:r>
             <a:endParaRPr lang="en-GB" dirty="0"/>
           </a:p>
@@ -5966,7 +6426,7 @@
         </p:nvSpPr>
         <p:spPr>
           <a:xfrm>
-            <a:off x="9261928" y="3123450"/>
+            <a:off x="9007928" y="3123450"/>
             <a:ext cx="1555298" cy="923330"/>
           </a:xfrm>
           <a:prstGeom prst="rect">
@@ -6072,10 +6532,10 @@
           <p:nvPr/>
         </p:nvPicPr>
         <p:blipFill>
-          <a:blip r:embed="rId2">
+          <a:blip r:embed="rId2" cstate="print">
             <a:extLst>
               <a:ext uri="{28A0092B-C50C-407E-A947-70E740481C1C}">
-                <a14:useLocalDpi xmlns:a14="http://schemas.microsoft.com/office/drawing/2010/main" val="0"/>
+                <a14:useLocalDpi xmlns:a14="http://schemas.microsoft.com/office/drawing/2010/main" xmlns="" val="0"/>
               </a:ext>
             </a:extLst>
           </a:blip>
@@ -6093,10 +6553,108 @@
           </a:prstGeom>
         </p:spPr>
       </p:pic>
+      <p:pic>
+        <p:nvPicPr>
+          <p:cNvPr id="8198" name="Picture 6" descr="http://images.clipartpanda.com/trophy-clipart-RTdMp69Rc.png"/>
+          <p:cNvPicPr>
+            <a:picLocks noChangeAspect="1" noChangeArrowheads="1"/>
+          </p:cNvPicPr>
+          <p:nvPr/>
+        </p:nvPicPr>
+        <p:blipFill>
+          <a:blip r:embed="rId3" cstate="print"/>
+          <a:srcRect/>
+          <a:stretch>
+            <a:fillRect/>
+          </a:stretch>
+        </p:blipFill>
+        <p:spPr bwMode="auto">
+          <a:xfrm rot="1023287">
+            <a:off x="10212919" y="2923305"/>
+            <a:ext cx="1484050" cy="1866021"/>
+          </a:xfrm>
+          <a:prstGeom prst="rect">
+            <a:avLst/>
+          </a:prstGeom>
+          <a:noFill/>
+        </p:spPr>
+      </p:pic>
+      <p:sp>
+        <p:nvSpPr>
+          <p:cNvPr id="9" name="Oval 8"/>
+          <p:cNvSpPr/>
+          <p:nvPr/>
+        </p:nvSpPr>
+        <p:spPr>
+          <a:xfrm>
+            <a:off x="9103360" y="4566920"/>
+            <a:ext cx="2143760" cy="735747"/>
+          </a:xfrm>
+          <a:prstGeom prst="ellipse">
+            <a:avLst/>
+          </a:prstGeom>
+          <a:solidFill>
+            <a:schemeClr val="accent1"/>
+          </a:solidFill>
+          <a:ln w="44450">
+            <a:solidFill>
+              <a:srgbClr val="C00000"/>
+            </a:solidFill>
+          </a:ln>
+        </p:spPr>
+        <p:txBody>
+          <a:bodyPr wrap="square" lIns="91440" tIns="45720" rIns="91440" bIns="45720">
+            <a:spAutoFit/>
+          </a:bodyPr>
+          <a:lstStyle/>
+          <a:p>
+            <a:pPr algn="ctr"/>
+            <a:r>
+              <a:rPr lang="en-US" sz="2800" b="1" cap="none" spc="0" dirty="0" smtClean="0">
+                <a:ln w="9525">
+                  <a:solidFill>
+                    <a:srgbClr val="C00000"/>
+                  </a:solidFill>
+                  <a:prstDash val="solid"/>
+                </a:ln>
+                <a:solidFill>
+                  <a:schemeClr val="tx1"/>
+                </a:solidFill>
+                <a:effectLst>
+                  <a:outerShdw blurRad="12700" dist="38100" dir="2700000" algn="tl" rotWithShape="0">
+                    <a:schemeClr val="bg1">
+                      <a:lumMod val="50000"/>
+                    </a:schemeClr>
+                  </a:outerShdw>
+                </a:effectLst>
+              </a:rPr>
+              <a:t>Better!</a:t>
+            </a:r>
+            <a:endParaRPr lang="en-US" sz="2800" b="1" cap="none" spc="0" dirty="0">
+              <a:ln w="9525">
+                <a:solidFill>
+                  <a:srgbClr val="C00000"/>
+                </a:solidFill>
+                <a:prstDash val="solid"/>
+              </a:ln>
+              <a:solidFill>
+                <a:schemeClr val="tx1"/>
+              </a:solidFill>
+              <a:effectLst>
+                <a:outerShdw blurRad="12700" dist="38100" dir="2700000" algn="tl" rotWithShape="0">
+                  <a:schemeClr val="bg1">
+                    <a:lumMod val="50000"/>
+                  </a:schemeClr>
+                </a:outerShdw>
+              </a:effectLst>
+            </a:endParaRPr>
+          </a:p>
+        </p:txBody>
+      </p:sp>
     </p:spTree>
     <p:extLst>
       <p:ext uri="{BB962C8B-B14F-4D97-AF65-F5344CB8AC3E}">
-        <p14:creationId xmlns:p14="http://schemas.microsoft.com/office/powerpoint/2010/main" val="844363323"/>
+        <p14:creationId xmlns:p14="http://schemas.microsoft.com/office/powerpoint/2010/main" xmlns="" val="844363323"/>
       </p:ext>
     </p:extLst>
   </p:cSld>
@@ -6144,12 +6702,20 @@
           <a:lstStyle/>
           <a:p>
             <a:r>
-              <a:rPr lang="tr-TR" dirty="0" err="1"/>
-              <a:t>Benefıts</a:t>
+              <a:rPr lang="tr-TR" dirty="0" smtClean="0"/>
+              <a:t>Benef</a:t>
+            </a:r>
+            <a:r>
+              <a:rPr lang="en-US" dirty="0" smtClean="0"/>
+              <a:t>I</a:t>
+            </a:r>
+            <a:r>
+              <a:rPr lang="tr-TR" dirty="0" smtClean="0"/>
+              <a:t>ts </a:t>
             </a:r>
             <a:r>
               <a:rPr lang="tr-TR" dirty="0"/>
-              <a:t> of MVC</a:t>
+              <a:t>of MVC</a:t>
             </a:r>
             <a:endParaRPr lang="en-GB" dirty="0"/>
           </a:p>
@@ -6165,9 +6731,16 @@
             <p:ph idx="1"/>
           </p:nvPr>
         </p:nvSpPr>
-        <p:spPr/>
-        <p:txBody>
-          <a:bodyPr/>
+        <p:spPr>
+          <a:xfrm>
+            <a:off x="685801" y="2020147"/>
+            <a:ext cx="10131425" cy="3649133"/>
+          </a:xfrm>
+        </p:spPr>
+        <p:txBody>
+          <a:bodyPr>
+            <a:normAutofit/>
+          </a:bodyPr>
           <a:lstStyle/>
           <a:p>
             <a:pPr>
@@ -6175,17 +6748,18 @@
               <a:buChar char="ü"/>
             </a:pPr>
             <a:r>
-              <a:rPr lang="tr-TR" dirty="0" err="1"/>
+              <a:rPr lang="tr-TR" sz="3200" dirty="0" smtClean="0"/>
               <a:t>F</a:t>
             </a:r>
             <a:r>
-              <a:rPr lang="en-US" dirty="0" err="1"/>
-              <a:t>lexibil</a:t>
-            </a:r>
-            <a:r>
-              <a:rPr lang="tr-TR" dirty="0"/>
+              <a:rPr lang="en-US" sz="3200" dirty="0" err="1" smtClean="0"/>
+              <a:t>lexibl</a:t>
+            </a:r>
+            <a:r>
+              <a:rPr lang="tr-TR" sz="3200" dirty="0" smtClean="0"/>
               <a:t>e</a:t>
             </a:r>
+            <a:endParaRPr lang="tr-TR" sz="3200" dirty="0"/>
           </a:p>
           <a:p>
             <a:pPr>
@@ -6193,10 +6767,10 @@
               <a:buChar char="ü"/>
             </a:pPr>
             <a:r>
-              <a:rPr lang="tr-TR" dirty="0" err="1"/>
+              <a:rPr lang="tr-TR" sz="3200" dirty="0" err="1"/>
               <a:t>Clear</a:t>
             </a:r>
-            <a:endParaRPr lang="tr-TR" dirty="0"/>
+            <a:endParaRPr lang="tr-TR" sz="3200" dirty="0"/>
           </a:p>
           <a:p>
             <a:pPr>
@@ -6204,18 +6778,22 @@
               <a:buChar char="ü"/>
             </a:pPr>
             <a:r>
-              <a:rPr lang="tr-TR" dirty="0"/>
+              <a:rPr lang="tr-TR" sz="3200" dirty="0"/>
               <a:t>E</a:t>
             </a:r>
             <a:r>
-              <a:rPr lang="en-US" dirty="0" err="1"/>
+              <a:rPr lang="en-US" sz="3200" dirty="0" err="1"/>
               <a:t>asier</a:t>
             </a:r>
             <a:r>
-              <a:rPr lang="en-US" dirty="0"/>
-              <a:t> to try different GUI ideas </a:t>
-            </a:r>
-            <a:endParaRPr lang="tr-TR" dirty="0"/>
+              <a:rPr lang="en-US" sz="3200" dirty="0"/>
+              <a:t> to try different GUI </a:t>
+            </a:r>
+            <a:r>
+              <a:rPr lang="en-US" sz="3200" dirty="0" smtClean="0"/>
+              <a:t>or control ideas </a:t>
+            </a:r>
+            <a:endParaRPr lang="tr-TR" sz="3200" dirty="0"/>
           </a:p>
           <a:p>
             <a:pPr>
@@ -6223,18 +6801,18 @@
               <a:buChar char="ü"/>
             </a:pPr>
             <a:r>
-              <a:rPr lang="tr-TR" dirty="0"/>
+              <a:rPr lang="tr-TR" sz="3200" dirty="0"/>
               <a:t>E</a:t>
             </a:r>
             <a:r>
-              <a:rPr lang="en-US" dirty="0" err="1"/>
+              <a:rPr lang="en-US" sz="3200" dirty="0" err="1"/>
               <a:t>asier</a:t>
             </a:r>
             <a:r>
-              <a:rPr lang="en-US" dirty="0"/>
+              <a:rPr lang="en-US" sz="3200" dirty="0"/>
               <a:t> during debugging</a:t>
             </a:r>
-            <a:endParaRPr lang="tr-TR" dirty="0"/>
+            <a:endParaRPr lang="tr-TR" sz="3200" dirty="0"/>
           </a:p>
           <a:p>
             <a:pPr>
@@ -6242,33 +6820,29 @@
               <a:buChar char="ü"/>
             </a:pPr>
             <a:r>
-              <a:rPr lang="tr-TR" dirty="0" err="1"/>
+              <a:rPr lang="tr-TR" sz="3200" dirty="0" smtClean="0"/>
               <a:t>Easier</a:t>
             </a:r>
             <a:r>
-              <a:rPr lang="tr-TR" dirty="0"/>
+              <a:rPr lang="en-US" sz="3200" dirty="0" smtClean="0"/>
+              <a:t> for</a:t>
+            </a:r>
+            <a:r>
+              <a:rPr lang="tr-TR" sz="3200" dirty="0" smtClean="0"/>
               <a:t> </a:t>
             </a:r>
             <a:r>
-              <a:rPr lang="tr-TR" dirty="0" err="1"/>
-              <a:t>further</a:t>
-            </a:r>
-            <a:r>
-              <a:rPr lang="tr-TR" dirty="0"/>
-              <a:t> </a:t>
-            </a:r>
-            <a:r>
-              <a:rPr lang="tr-TR" dirty="0" err="1"/>
-              <a:t>implementations</a:t>
-            </a:r>
-            <a:endParaRPr lang="en-GB" dirty="0"/>
+              <a:rPr lang="tr-TR" sz="3200" dirty="0"/>
+              <a:t>further implementations</a:t>
+            </a:r>
+            <a:endParaRPr lang="en-GB" sz="3200" dirty="0"/>
           </a:p>
         </p:txBody>
       </p:sp>
     </p:spTree>
     <p:extLst>
       <p:ext uri="{BB962C8B-B14F-4D97-AF65-F5344CB8AC3E}">
-        <p14:creationId xmlns:p14="http://schemas.microsoft.com/office/powerpoint/2010/main" val="3887066343"/>
+        <p14:creationId xmlns:p14="http://schemas.microsoft.com/office/powerpoint/2010/main" xmlns="" val="3887066343"/>
       </p:ext>
     </p:extLst>
   </p:cSld>
@@ -6311,8 +6885,24 @@
           <a:lstStyle/>
           <a:p>
             <a:r>
+              <a:rPr lang="en-GB" dirty="0" err="1" smtClean="0"/>
+              <a:t>AddItIonal</a:t>
+            </a:r>
+            <a:r>
+              <a:rPr lang="en-GB" dirty="0" smtClean="0"/>
+              <a:t> </a:t>
+            </a:r>
+            <a:r>
+              <a:rPr lang="en-GB" dirty="0" err="1" smtClean="0"/>
+              <a:t>desIgn</a:t>
+            </a:r>
+            <a:r>
+              <a:rPr lang="en-GB" dirty="0" smtClean="0"/>
+              <a:t> </a:t>
+            </a:r>
+            <a:r>
               <a:rPr lang="en-GB" dirty="0"/>
-              <a:t>Addıtıonal desıgn patterns</a:t>
+              <a:t>patterns</a:t>
             </a:r>
           </a:p>
         </p:txBody>
@@ -6327,9 +6917,16 @@
             <p:ph idx="1"/>
           </p:nvPr>
         </p:nvSpPr>
-        <p:spPr/>
-        <p:txBody>
-          <a:bodyPr/>
+        <p:spPr>
+          <a:xfrm>
+            <a:off x="685801" y="2142067"/>
+            <a:ext cx="8839199" cy="3649133"/>
+          </a:xfrm>
+        </p:spPr>
+        <p:txBody>
+          <a:bodyPr>
+            <a:normAutofit/>
+          </a:bodyPr>
           <a:lstStyle/>
           <a:p>
             <a:pPr>
@@ -6337,42 +6934,42 @@
               <a:buChar char="ü"/>
             </a:pPr>
             <a:r>
-              <a:rPr lang="tr-TR" dirty="0" err="1"/>
+              <a:rPr lang="tr-TR" sz="3600" dirty="0" err="1"/>
               <a:t>Singleton</a:t>
             </a:r>
             <a:r>
-              <a:rPr lang="tr-TR" dirty="0"/>
+              <a:rPr lang="tr-TR" sz="3600" dirty="0"/>
               <a:t> </a:t>
             </a:r>
             <a:r>
-              <a:rPr lang="tr-TR" dirty="0" err="1"/>
+              <a:rPr lang="tr-TR" sz="3600" dirty="0" err="1"/>
               <a:t>will</a:t>
             </a:r>
             <a:r>
-              <a:rPr lang="tr-TR" dirty="0"/>
+              <a:rPr lang="tr-TR" sz="3600" dirty="0"/>
               <a:t> be </a:t>
             </a:r>
             <a:r>
-              <a:rPr lang="tr-TR" dirty="0" err="1"/>
+              <a:rPr lang="tr-TR" sz="3600" dirty="0" err="1"/>
               <a:t>used</a:t>
             </a:r>
             <a:r>
-              <a:rPr lang="tr-TR" dirty="0"/>
+              <a:rPr lang="tr-TR" sz="3600" dirty="0"/>
               <a:t> </a:t>
             </a:r>
             <a:r>
-              <a:rPr lang="tr-TR" dirty="0" err="1"/>
+              <a:rPr lang="tr-TR" sz="3600" dirty="0" err="1"/>
               <a:t>to</a:t>
             </a:r>
             <a:r>
-              <a:rPr lang="tr-TR" dirty="0"/>
+              <a:rPr lang="tr-TR" sz="3600" dirty="0"/>
               <a:t> </a:t>
             </a:r>
             <a:r>
-              <a:rPr lang="en-US" dirty="0"/>
+              <a:rPr lang="en-US" sz="3600" dirty="0"/>
               <a:t>store/retrieve persistent data, such as save data and preferences.</a:t>
             </a:r>
-            <a:endParaRPr lang="tr-TR" dirty="0"/>
+            <a:endParaRPr lang="tr-TR" sz="3600" dirty="0"/>
           </a:p>
           <a:p>
             <a:pPr>
@@ -6380,25 +6977,51 @@
               <a:buChar char="ü"/>
             </a:pPr>
             <a:r>
-              <a:rPr lang="en-US" dirty="0"/>
+              <a:rPr lang="en-US" sz="3600" dirty="0"/>
               <a:t>The game is to be a desktop application packed into a single </a:t>
             </a:r>
             <a:r>
-              <a:rPr lang="en-US" i="1" dirty="0"/>
+              <a:rPr lang="en-US" sz="3600" i="1" dirty="0"/>
               <a:t>.jar </a:t>
             </a:r>
             <a:r>
-              <a:rPr lang="en-US" dirty="0"/>
+              <a:rPr lang="en-US" sz="3600" dirty="0"/>
               <a:t>file</a:t>
             </a:r>
-            <a:endParaRPr lang="en-GB" dirty="0"/>
-          </a:p>
-        </p:txBody>
-      </p:sp>
+            <a:endParaRPr lang="en-GB" sz="3600" dirty="0"/>
+          </a:p>
+        </p:txBody>
+      </p:sp>
+      <p:pic>
+        <p:nvPicPr>
+          <p:cNvPr id="6146" name="Picture 2" descr="http://icons.iconseeker.com/png/fullsize/rhor-v2-part-3/jar-file.png"/>
+          <p:cNvPicPr>
+            <a:picLocks noChangeAspect="1" noChangeArrowheads="1"/>
+          </p:cNvPicPr>
+          <p:nvPr/>
+        </p:nvPicPr>
+        <p:blipFill>
+          <a:blip r:embed="rId2" cstate="print"/>
+          <a:srcRect/>
+          <a:stretch>
+            <a:fillRect/>
+          </a:stretch>
+        </p:blipFill>
+        <p:spPr bwMode="auto">
+          <a:xfrm>
+            <a:off x="8796654" y="3117214"/>
+            <a:ext cx="2983865" cy="2983865"/>
+          </a:xfrm>
+          <a:prstGeom prst="rect">
+            <a:avLst/>
+          </a:prstGeom>
+          <a:noFill/>
+        </p:spPr>
+      </p:pic>
     </p:spTree>
     <p:extLst>
       <p:ext uri="{BB962C8B-B14F-4D97-AF65-F5344CB8AC3E}">
-        <p14:creationId xmlns:p14="http://schemas.microsoft.com/office/powerpoint/2010/main" val="2508010582"/>
+        <p14:creationId xmlns:p14="http://schemas.microsoft.com/office/powerpoint/2010/main" xmlns="" val="2508010582"/>
       </p:ext>
     </p:extLst>
   </p:cSld>
@@ -6480,10 +7103,589 @@
           </a:ln>
         </p:spPr>
       </p:pic>
+      <p:sp>
+        <p:nvSpPr>
+          <p:cNvPr id="5121" name="Text Box 1"/>
+          <p:cNvSpPr txBox="1">
+            <a:spLocks noChangeArrowheads="1"/>
+          </p:cNvSpPr>
+          <p:nvPr/>
+        </p:nvSpPr>
+        <p:spPr bwMode="auto">
+          <a:xfrm>
+            <a:off x="3353435" y="1042988"/>
+            <a:ext cx="934085" cy="613092"/>
+          </a:xfrm>
+          <a:prstGeom prst="rect">
+            <a:avLst/>
+          </a:prstGeom>
+          <a:solidFill>
+            <a:srgbClr val="D6E3BC"/>
+          </a:solidFill>
+          <a:ln w="9525">
+            <a:noFill/>
+            <a:miter lim="800000"/>
+            <a:headEnd/>
+            <a:tailEnd/>
+          </a:ln>
+        </p:spPr>
+        <p:txBody>
+          <a:bodyPr vert="horz" wrap="square" lIns="0" tIns="0" rIns="0" bIns="0" numCol="1" anchor="t" anchorCtr="0" compatLnSpc="1">
+            <a:prstTxWarp prst="textNoShape">
+              <a:avLst/>
+            </a:prstTxWarp>
+          </a:bodyPr>
+          <a:lstStyle/>
+          <a:p>
+            <a:pPr marL="0" marR="0" lvl="0" indent="0" algn="ctr" defTabSz="914400" rtl="0" eaLnBrk="1" fontAlgn="base" latinLnBrk="0" hangingPunct="1">
+              <a:lnSpc>
+                <a:spcPct val="100000"/>
+              </a:lnSpc>
+              <a:spcBef>
+                <a:spcPct val="0"/>
+              </a:spcBef>
+              <a:spcAft>
+                <a:spcPts val="1000"/>
+              </a:spcAft>
+              <a:buClrTx/>
+              <a:buSzTx/>
+              <a:buFontTx/>
+              <a:buNone/>
+              <a:tabLst/>
+            </a:pPr>
+            <a:r>
+              <a:rPr kumimoji="0" lang="en-US" sz="1600" b="1" i="0" u="none" strike="noStrike" cap="none" normalizeH="0" baseline="0" dirty="0" smtClean="0">
+                <a:ln>
+                  <a:noFill/>
+                </a:ln>
+                <a:solidFill>
+                  <a:schemeClr val="bg1"/>
+                </a:solidFill>
+                <a:effectLst/>
+                <a:latin typeface="Calibri" pitchFamily="34" charset="0"/>
+                <a:cs typeface="Arial" pitchFamily="34" charset="0"/>
+              </a:rPr>
+              <a:t>Assets</a:t>
+            </a:r>
+          </a:p>
+          <a:p>
+            <a:pPr marL="0" marR="0" lvl="0" indent="0" algn="ctr" defTabSz="914400" rtl="0" eaLnBrk="1" fontAlgn="base" latinLnBrk="0" hangingPunct="1">
+              <a:lnSpc>
+                <a:spcPct val="100000"/>
+              </a:lnSpc>
+              <a:spcBef>
+                <a:spcPct val="0"/>
+              </a:spcBef>
+              <a:spcAft>
+                <a:spcPts val="1000"/>
+              </a:spcAft>
+              <a:buClrTx/>
+              <a:buSzTx/>
+              <a:buFontTx/>
+              <a:buNone/>
+              <a:tabLst/>
+            </a:pPr>
+            <a:r>
+              <a:rPr kumimoji="0" lang="en-US" sz="1600" b="1" i="0" u="none" strike="noStrike" cap="none" normalizeH="0" baseline="0" dirty="0" smtClean="0">
+                <a:ln>
+                  <a:noFill/>
+                </a:ln>
+                <a:solidFill>
+                  <a:schemeClr val="bg1"/>
+                </a:solidFill>
+                <a:effectLst/>
+                <a:latin typeface="Calibri" pitchFamily="34" charset="0"/>
+                <a:cs typeface="Arial" pitchFamily="34" charset="0"/>
+              </a:rPr>
+              <a:t>&amp; Saves</a:t>
+            </a:r>
+            <a:endParaRPr kumimoji="0" lang="en-US" sz="1600" b="1" i="0" u="none" strike="noStrike" cap="none" normalizeH="0" baseline="0" dirty="0" smtClean="0">
+              <a:ln>
+                <a:noFill/>
+              </a:ln>
+              <a:solidFill>
+                <a:schemeClr val="bg1"/>
+              </a:solidFill>
+              <a:effectLst/>
+              <a:latin typeface="Arial" pitchFamily="34" charset="0"/>
+              <a:cs typeface="Arial" pitchFamily="34" charset="0"/>
+            </a:endParaRPr>
+          </a:p>
+        </p:txBody>
+      </p:sp>
+      <p:sp>
+        <p:nvSpPr>
+          <p:cNvPr id="5122" name="Text Box 2"/>
+          <p:cNvSpPr txBox="1">
+            <a:spLocks noChangeArrowheads="1"/>
+          </p:cNvSpPr>
+          <p:nvPr/>
+        </p:nvSpPr>
+        <p:spPr bwMode="auto">
+          <a:xfrm>
+            <a:off x="916940" y="2604135"/>
+            <a:ext cx="434340" cy="2658745"/>
+          </a:xfrm>
+          <a:prstGeom prst="rect">
+            <a:avLst/>
+          </a:prstGeom>
+          <a:solidFill>
+            <a:srgbClr val="C0504D"/>
+          </a:solidFill>
+          <a:ln w="9525">
+            <a:solidFill>
+              <a:srgbClr val="000000"/>
+            </a:solidFill>
+            <a:miter lim="800000"/>
+            <a:headEnd/>
+            <a:tailEnd/>
+          </a:ln>
+        </p:spPr>
+        <p:txBody>
+          <a:bodyPr vert="horz" wrap="square" lIns="91440" tIns="45720" rIns="91440" bIns="45720" numCol="1" anchor="t" anchorCtr="0" compatLnSpc="1">
+            <a:prstTxWarp prst="textNoShape">
+              <a:avLst/>
+            </a:prstTxWarp>
+          </a:bodyPr>
+          <a:lstStyle/>
+          <a:p>
+            <a:pPr marL="0" marR="0" lvl="0" indent="0" algn="ctr" defTabSz="914400" rtl="0" eaLnBrk="1" fontAlgn="base" latinLnBrk="0" hangingPunct="1">
+              <a:lnSpc>
+                <a:spcPct val="100000"/>
+              </a:lnSpc>
+              <a:spcBef>
+                <a:spcPct val="0"/>
+              </a:spcBef>
+              <a:spcAft>
+                <a:spcPts val="1000"/>
+              </a:spcAft>
+              <a:buClrTx/>
+              <a:buSzTx/>
+              <a:buFontTx/>
+              <a:buNone/>
+              <a:tabLst/>
+            </a:pPr>
+            <a:r>
+              <a:rPr kumimoji="0" lang="en-US" b="1" i="0" u="none" strike="noStrike" cap="none" normalizeH="0" baseline="0" dirty="0" smtClean="0">
+                <a:ln>
+                  <a:noFill/>
+                </a:ln>
+                <a:solidFill>
+                  <a:schemeClr val="bg1"/>
+                </a:solidFill>
+                <a:effectLst/>
+                <a:latin typeface="+mj-lt"/>
+                <a:cs typeface="Arial" pitchFamily="34" charset="0"/>
+              </a:rPr>
+              <a:t>P</a:t>
+            </a:r>
+          </a:p>
+          <a:p>
+            <a:pPr marL="0" marR="0" lvl="0" indent="0" algn="ctr" defTabSz="914400" rtl="0" eaLnBrk="1" fontAlgn="base" latinLnBrk="0" hangingPunct="1">
+              <a:lnSpc>
+                <a:spcPct val="100000"/>
+              </a:lnSpc>
+              <a:spcBef>
+                <a:spcPct val="0"/>
+              </a:spcBef>
+              <a:spcAft>
+                <a:spcPts val="1000"/>
+              </a:spcAft>
+              <a:buClrTx/>
+              <a:buSzTx/>
+              <a:buFontTx/>
+              <a:buNone/>
+              <a:tabLst/>
+            </a:pPr>
+            <a:r>
+              <a:rPr kumimoji="0" lang="en-US" b="1" i="0" u="none" strike="noStrike" cap="none" normalizeH="0" baseline="0" dirty="0" smtClean="0">
+                <a:ln>
+                  <a:noFill/>
+                </a:ln>
+                <a:solidFill>
+                  <a:schemeClr val="bg1"/>
+                </a:solidFill>
+                <a:effectLst/>
+                <a:latin typeface="+mj-lt"/>
+                <a:cs typeface="Arial" pitchFamily="34" charset="0"/>
+              </a:rPr>
+              <a:t>l</a:t>
+            </a:r>
+          </a:p>
+          <a:p>
+            <a:pPr marL="0" marR="0" lvl="0" indent="0" algn="ctr" defTabSz="914400" rtl="0" eaLnBrk="1" fontAlgn="base" latinLnBrk="0" hangingPunct="1">
+              <a:lnSpc>
+                <a:spcPct val="100000"/>
+              </a:lnSpc>
+              <a:spcBef>
+                <a:spcPct val="0"/>
+              </a:spcBef>
+              <a:spcAft>
+                <a:spcPts val="1000"/>
+              </a:spcAft>
+              <a:buClrTx/>
+              <a:buSzTx/>
+              <a:buFontTx/>
+              <a:buNone/>
+              <a:tabLst/>
+            </a:pPr>
+            <a:r>
+              <a:rPr kumimoji="0" lang="en-US" b="1" i="0" u="none" strike="noStrike" cap="none" normalizeH="0" baseline="0" dirty="0" smtClean="0">
+                <a:ln>
+                  <a:noFill/>
+                </a:ln>
+                <a:solidFill>
+                  <a:schemeClr val="bg1"/>
+                </a:solidFill>
+                <a:effectLst/>
+                <a:latin typeface="+mj-lt"/>
+                <a:cs typeface="Arial" pitchFamily="34" charset="0"/>
+              </a:rPr>
+              <a:t>a</a:t>
+            </a:r>
+          </a:p>
+          <a:p>
+            <a:pPr marL="0" marR="0" lvl="0" indent="0" algn="ctr" defTabSz="914400" rtl="0" eaLnBrk="1" fontAlgn="base" latinLnBrk="0" hangingPunct="1">
+              <a:lnSpc>
+                <a:spcPct val="100000"/>
+              </a:lnSpc>
+              <a:spcBef>
+                <a:spcPct val="0"/>
+              </a:spcBef>
+              <a:spcAft>
+                <a:spcPts val="1000"/>
+              </a:spcAft>
+              <a:buClrTx/>
+              <a:buSzTx/>
+              <a:buFontTx/>
+              <a:buNone/>
+              <a:tabLst/>
+            </a:pPr>
+            <a:r>
+              <a:rPr kumimoji="0" lang="en-US" b="1" i="0" u="none" strike="noStrike" cap="none" normalizeH="0" baseline="0" dirty="0" smtClean="0">
+                <a:ln>
+                  <a:noFill/>
+                </a:ln>
+                <a:solidFill>
+                  <a:schemeClr val="bg1"/>
+                </a:solidFill>
+                <a:effectLst/>
+                <a:latin typeface="+mj-lt"/>
+                <a:cs typeface="Arial" pitchFamily="34" charset="0"/>
+              </a:rPr>
+              <a:t>y</a:t>
+            </a:r>
+          </a:p>
+          <a:p>
+            <a:pPr marL="0" marR="0" lvl="0" indent="0" algn="ctr" defTabSz="914400" rtl="0" eaLnBrk="1" fontAlgn="base" latinLnBrk="0" hangingPunct="1">
+              <a:lnSpc>
+                <a:spcPct val="100000"/>
+              </a:lnSpc>
+              <a:spcBef>
+                <a:spcPct val="0"/>
+              </a:spcBef>
+              <a:spcAft>
+                <a:spcPts val="1000"/>
+              </a:spcAft>
+              <a:buClrTx/>
+              <a:buSzTx/>
+              <a:buFontTx/>
+              <a:buNone/>
+              <a:tabLst/>
+            </a:pPr>
+            <a:r>
+              <a:rPr kumimoji="0" lang="en-US" b="1" i="0" u="none" strike="noStrike" cap="none" normalizeH="0" baseline="0" dirty="0" smtClean="0">
+                <a:ln>
+                  <a:noFill/>
+                </a:ln>
+                <a:solidFill>
+                  <a:schemeClr val="bg1"/>
+                </a:solidFill>
+                <a:effectLst/>
+                <a:latin typeface="+mj-lt"/>
+                <a:cs typeface="Arial" pitchFamily="34" charset="0"/>
+              </a:rPr>
+              <a:t>e</a:t>
+            </a:r>
+          </a:p>
+          <a:p>
+            <a:pPr marL="0" marR="0" lvl="0" indent="0" algn="ctr" defTabSz="914400" rtl="0" eaLnBrk="1" fontAlgn="base" latinLnBrk="0" hangingPunct="1">
+              <a:lnSpc>
+                <a:spcPct val="100000"/>
+              </a:lnSpc>
+              <a:spcBef>
+                <a:spcPct val="0"/>
+              </a:spcBef>
+              <a:spcAft>
+                <a:spcPts val="1000"/>
+              </a:spcAft>
+              <a:buClrTx/>
+              <a:buSzTx/>
+              <a:buFontTx/>
+              <a:buNone/>
+              <a:tabLst/>
+            </a:pPr>
+            <a:r>
+              <a:rPr kumimoji="0" lang="en-US" b="1" i="0" u="none" strike="noStrike" cap="none" normalizeH="0" baseline="0" dirty="0" smtClean="0">
+                <a:ln>
+                  <a:noFill/>
+                </a:ln>
+                <a:solidFill>
+                  <a:schemeClr val="bg1"/>
+                </a:solidFill>
+                <a:effectLst/>
+                <a:latin typeface="+mj-lt"/>
+                <a:cs typeface="Arial" pitchFamily="34" charset="0"/>
+              </a:rPr>
+              <a:t>r</a:t>
+            </a:r>
+          </a:p>
+        </p:txBody>
+      </p:sp>
+      <p:sp>
+        <p:nvSpPr>
+          <p:cNvPr id="5123" name="Text Box 3"/>
+          <p:cNvSpPr txBox="1">
+            <a:spLocks noChangeArrowheads="1"/>
+          </p:cNvSpPr>
+          <p:nvPr/>
+        </p:nvSpPr>
+        <p:spPr bwMode="auto">
+          <a:xfrm>
+            <a:off x="4297680" y="4068128"/>
+            <a:ext cx="1327785" cy="341312"/>
+          </a:xfrm>
+          <a:prstGeom prst="rect">
+            <a:avLst/>
+          </a:prstGeom>
+          <a:solidFill>
+            <a:srgbClr val="C0504D">
+              <a:alpha val="0"/>
+            </a:srgbClr>
+          </a:solidFill>
+          <a:ln w="9525">
+            <a:noFill/>
+            <a:miter lim="800000"/>
+            <a:headEnd/>
+            <a:tailEnd/>
+          </a:ln>
+        </p:spPr>
+        <p:txBody>
+          <a:bodyPr vert="horz" wrap="square" lIns="91440" tIns="45720" rIns="91440" bIns="45720" numCol="1" anchor="t" anchorCtr="0" compatLnSpc="1">
+            <a:prstTxWarp prst="textNoShape">
+              <a:avLst/>
+            </a:prstTxWarp>
+          </a:bodyPr>
+          <a:lstStyle/>
+          <a:p>
+            <a:pPr marL="0" marR="0" lvl="0" indent="0" algn="l" defTabSz="914400" rtl="0" eaLnBrk="1" fontAlgn="base" latinLnBrk="0" hangingPunct="1">
+              <a:lnSpc>
+                <a:spcPct val="100000"/>
+              </a:lnSpc>
+              <a:spcBef>
+                <a:spcPct val="0"/>
+              </a:spcBef>
+              <a:spcAft>
+                <a:spcPts val="1000"/>
+              </a:spcAft>
+              <a:buClrTx/>
+              <a:buSzTx/>
+              <a:buFontTx/>
+              <a:buNone/>
+              <a:tabLst/>
+            </a:pPr>
+            <a:r>
+              <a:rPr kumimoji="0" lang="en-US" sz="2000" b="0" i="0" u="none" strike="noStrike" cap="none" normalizeH="0" baseline="0" dirty="0" smtClean="0">
+                <a:ln>
+                  <a:noFill/>
+                </a:ln>
+                <a:solidFill>
+                  <a:schemeClr val="bg1"/>
+                </a:solidFill>
+                <a:effectLst/>
+                <a:latin typeface="Calibri" pitchFamily="34" charset="0"/>
+                <a:cs typeface="Arial" pitchFamily="34" charset="0"/>
+              </a:rPr>
+              <a:t> (Model)</a:t>
+            </a:r>
+            <a:endParaRPr kumimoji="0" lang="en-US" sz="2000" b="0" i="0" u="none" strike="noStrike" cap="none" normalizeH="0" baseline="0" dirty="0" smtClean="0">
+              <a:ln>
+                <a:noFill/>
+              </a:ln>
+              <a:solidFill>
+                <a:schemeClr val="bg1"/>
+              </a:solidFill>
+              <a:effectLst/>
+              <a:latin typeface="Arial" pitchFamily="34" charset="0"/>
+              <a:cs typeface="Arial" pitchFamily="34" charset="0"/>
+            </a:endParaRPr>
+          </a:p>
+        </p:txBody>
+      </p:sp>
+      <p:sp>
+        <p:nvSpPr>
+          <p:cNvPr id="7" name="Text Box 3"/>
+          <p:cNvSpPr txBox="1">
+            <a:spLocks noChangeArrowheads="1"/>
+          </p:cNvSpPr>
+          <p:nvPr/>
+        </p:nvSpPr>
+        <p:spPr bwMode="auto">
+          <a:xfrm>
+            <a:off x="1381760" y="3966528"/>
+            <a:ext cx="1530985" cy="341312"/>
+          </a:xfrm>
+          <a:prstGeom prst="rect">
+            <a:avLst/>
+          </a:prstGeom>
+          <a:solidFill>
+            <a:srgbClr val="C0504D">
+              <a:alpha val="0"/>
+            </a:srgbClr>
+          </a:solidFill>
+          <a:ln w="9525">
+            <a:noFill/>
+            <a:miter lim="800000"/>
+            <a:headEnd/>
+            <a:tailEnd/>
+          </a:ln>
+        </p:spPr>
+        <p:txBody>
+          <a:bodyPr vert="horz" wrap="square" lIns="91440" tIns="45720" rIns="91440" bIns="45720" numCol="1" anchor="t" anchorCtr="0" compatLnSpc="1">
+            <a:prstTxWarp prst="textNoShape">
+              <a:avLst/>
+            </a:prstTxWarp>
+          </a:bodyPr>
+          <a:lstStyle/>
+          <a:p>
+            <a:pPr marL="0" marR="0" lvl="0" indent="0" algn="l" defTabSz="914400" rtl="0" eaLnBrk="1" fontAlgn="base" latinLnBrk="0" hangingPunct="1">
+              <a:lnSpc>
+                <a:spcPct val="100000"/>
+              </a:lnSpc>
+              <a:spcBef>
+                <a:spcPct val="0"/>
+              </a:spcBef>
+              <a:spcAft>
+                <a:spcPts val="1000"/>
+              </a:spcAft>
+              <a:buClrTx/>
+              <a:buSzTx/>
+              <a:buFontTx/>
+              <a:buNone/>
+              <a:tabLst/>
+            </a:pPr>
+            <a:r>
+              <a:rPr kumimoji="0" lang="en-US" sz="2000" b="0" i="0" u="none" strike="noStrike" cap="none" normalizeH="0" baseline="0" dirty="0" smtClean="0">
+                <a:ln>
+                  <a:noFill/>
+                </a:ln>
+                <a:solidFill>
+                  <a:schemeClr val="bg1"/>
+                </a:solidFill>
+                <a:effectLst/>
+                <a:latin typeface="Calibri" pitchFamily="34" charset="0"/>
+                <a:cs typeface="Arial" pitchFamily="34" charset="0"/>
+              </a:rPr>
+              <a:t> (Controllers)</a:t>
+            </a:r>
+            <a:endParaRPr kumimoji="0" lang="en-US" sz="2000" b="0" i="0" u="none" strike="noStrike" cap="none" normalizeH="0" baseline="0" dirty="0" smtClean="0">
+              <a:ln>
+                <a:noFill/>
+              </a:ln>
+              <a:solidFill>
+                <a:schemeClr val="bg1"/>
+              </a:solidFill>
+              <a:effectLst/>
+              <a:latin typeface="Arial" pitchFamily="34" charset="0"/>
+              <a:cs typeface="Arial" pitchFamily="34" charset="0"/>
+            </a:endParaRPr>
+          </a:p>
+        </p:txBody>
+      </p:sp>
+      <p:sp>
+        <p:nvSpPr>
+          <p:cNvPr id="8" name="Text Box 3"/>
+          <p:cNvSpPr txBox="1">
+            <a:spLocks noChangeArrowheads="1"/>
+          </p:cNvSpPr>
+          <p:nvPr/>
+        </p:nvSpPr>
+        <p:spPr bwMode="auto">
+          <a:xfrm>
+            <a:off x="8636000" y="3417888"/>
+            <a:ext cx="1530985" cy="341312"/>
+          </a:xfrm>
+          <a:prstGeom prst="rect">
+            <a:avLst/>
+          </a:prstGeom>
+          <a:solidFill>
+            <a:srgbClr val="C0504D">
+              <a:alpha val="0"/>
+            </a:srgbClr>
+          </a:solidFill>
+          <a:ln w="9525">
+            <a:noFill/>
+            <a:miter lim="800000"/>
+            <a:headEnd/>
+            <a:tailEnd/>
+          </a:ln>
+        </p:spPr>
+        <p:txBody>
+          <a:bodyPr vert="horz" wrap="square" lIns="91440" tIns="45720" rIns="91440" bIns="45720" numCol="1" anchor="t" anchorCtr="0" compatLnSpc="1">
+            <a:prstTxWarp prst="textNoShape">
+              <a:avLst/>
+            </a:prstTxWarp>
+          </a:bodyPr>
+          <a:lstStyle/>
+          <a:p>
+            <a:pPr marL="0" marR="0" lvl="0" indent="0" algn="l" defTabSz="914400" rtl="0" eaLnBrk="1" fontAlgn="base" latinLnBrk="0" hangingPunct="1">
+              <a:lnSpc>
+                <a:spcPct val="100000"/>
+              </a:lnSpc>
+              <a:spcBef>
+                <a:spcPct val="0"/>
+              </a:spcBef>
+              <a:spcAft>
+                <a:spcPts val="1000"/>
+              </a:spcAft>
+              <a:buClrTx/>
+              <a:buSzTx/>
+              <a:buFontTx/>
+              <a:buNone/>
+              <a:tabLst/>
+            </a:pPr>
+            <a:r>
+              <a:rPr kumimoji="0" lang="en-US" sz="2000" b="0" i="0" u="none" strike="noStrike" cap="none" normalizeH="0" baseline="0" dirty="0" smtClean="0">
+                <a:ln>
+                  <a:noFill/>
+                </a:ln>
+                <a:solidFill>
+                  <a:schemeClr val="bg1"/>
+                </a:solidFill>
+                <a:effectLst/>
+                <a:latin typeface="Calibri" pitchFamily="34" charset="0"/>
+                <a:cs typeface="Arial" pitchFamily="34" charset="0"/>
+              </a:rPr>
+              <a:t> (View)</a:t>
+            </a:r>
+            <a:endParaRPr kumimoji="0" lang="en-US" sz="2000" b="0" i="0" u="none" strike="noStrike" cap="none" normalizeH="0" baseline="0" dirty="0" smtClean="0">
+              <a:ln>
+                <a:noFill/>
+              </a:ln>
+              <a:solidFill>
+                <a:schemeClr val="bg1"/>
+              </a:solidFill>
+              <a:effectLst/>
+              <a:latin typeface="Arial" pitchFamily="34" charset="0"/>
+              <a:cs typeface="Arial" pitchFamily="34" charset="0"/>
+            </a:endParaRPr>
+          </a:p>
+        </p:txBody>
+      </p:sp>
     </p:spTree>
     <p:extLst>
       <p:ext uri="{BB962C8B-B14F-4D97-AF65-F5344CB8AC3E}">
-        <p14:creationId xmlns:p14="http://schemas.microsoft.com/office/powerpoint/2010/main" val="1553756427"/>
+        <p14:creationId xmlns:p14="http://schemas.microsoft.com/office/powerpoint/2010/main" xmlns="" val="1553756427"/>
       </p:ext>
     </p:extLst>
   </p:cSld>
@@ -6542,102 +7744,197 @@
             <p:ph idx="1"/>
           </p:nvPr>
         </p:nvSpPr>
-        <p:spPr/>
+        <p:spPr>
+          <a:xfrm>
+            <a:off x="665481" y="2131907"/>
+            <a:ext cx="7381239" cy="3649133"/>
+          </a:xfrm>
+        </p:spPr>
         <p:txBody>
           <a:bodyPr/>
           <a:lstStyle/>
           <a:p>
             <a:r>
-              <a:rPr lang="en-US" dirty="0" err="1"/>
+              <a:rPr lang="en-US" sz="2800" dirty="0" err="1"/>
               <a:t>libGDX</a:t>
             </a:r>
             <a:r>
-              <a:rPr lang="en-US" dirty="0"/>
+              <a:rPr lang="en-US" sz="2800" dirty="0"/>
               <a:t> </a:t>
             </a:r>
             <a:r>
-              <a:rPr lang="tr-TR" dirty="0">
+              <a:rPr lang="tr-TR" sz="2800" dirty="0">
                 <a:sym typeface="Wingdings" panose="05000000000000000000" pitchFamily="2" charset="2"/>
               </a:rPr>
               <a:t> </a:t>
             </a:r>
             <a:r>
-              <a:rPr lang="en-US" dirty="0"/>
+              <a:rPr lang="en-US" sz="2800" dirty="0"/>
               <a:t>extensive API, and efficient garbage collection</a:t>
             </a:r>
-            <a:endParaRPr lang="tr-TR" dirty="0"/>
-          </a:p>
-          <a:p>
-            <a:r>
-              <a:rPr lang="en-US" dirty="0"/>
+            <a:endParaRPr lang="tr-TR" sz="2800" dirty="0"/>
+          </a:p>
+          <a:p>
+            <a:r>
+              <a:rPr lang="en-US" sz="2800" dirty="0"/>
               <a:t>Box2D </a:t>
             </a:r>
             <a:r>
-              <a:rPr lang="tr-TR" dirty="0"/>
+              <a:rPr lang="tr-TR" sz="2800" dirty="0"/>
               <a:t> </a:t>
             </a:r>
             <a:r>
-              <a:rPr lang="tr-TR" dirty="0">
+              <a:rPr lang="tr-TR" sz="2800" dirty="0">
                 <a:sym typeface="Wingdings" panose="05000000000000000000" pitchFamily="2" charset="2"/>
               </a:rPr>
               <a:t> </a:t>
             </a:r>
             <a:r>
-              <a:rPr lang="en-US" dirty="0"/>
+              <a:rPr lang="en-US" sz="2800" dirty="0"/>
               <a:t>physics engine, compatible with </a:t>
             </a:r>
             <a:r>
-              <a:rPr lang="en-US" dirty="0" err="1"/>
+              <a:rPr lang="en-US" sz="2800" dirty="0" err="1"/>
               <a:t>libGDX</a:t>
             </a:r>
             <a:r>
-              <a:rPr lang="en-US" dirty="0"/>
+              <a:rPr lang="en-US" sz="2800" dirty="0"/>
               <a:t> for the core of the game</a:t>
             </a:r>
           </a:p>
           <a:p>
             <a:r>
-              <a:rPr lang="tr-TR" dirty="0"/>
+              <a:rPr lang="tr-TR" sz="2800" dirty="0"/>
               <a:t>S</a:t>
             </a:r>
             <a:r>
-              <a:rPr lang="en-US" dirty="0" err="1"/>
+              <a:rPr lang="en-US" sz="2800" dirty="0" err="1"/>
               <a:t>erialization</a:t>
             </a:r>
             <a:r>
-              <a:rPr lang="en-US" dirty="0"/>
+              <a:rPr lang="en-US" sz="2800" dirty="0"/>
               <a:t> </a:t>
             </a:r>
             <a:r>
-              <a:rPr lang="tr-TR" dirty="0">
+              <a:rPr lang="tr-TR" sz="2800" dirty="0">
                 <a:sym typeface="Wingdings" panose="05000000000000000000" pitchFamily="2" charset="2"/>
               </a:rPr>
               <a:t> </a:t>
             </a:r>
             <a:r>
-              <a:rPr lang="en-US" dirty="0"/>
+              <a:rPr lang="en-US" sz="2800" dirty="0"/>
               <a:t>for saving scores and game progress.</a:t>
             </a:r>
+            <a:endParaRPr lang="tr-TR" sz="2800" dirty="0"/>
+          </a:p>
+          <a:p>
             <a:endParaRPr lang="tr-TR" dirty="0"/>
           </a:p>
           <a:p>
-            <a:endParaRPr lang="tr-TR" dirty="0"/>
-          </a:p>
-          <a:p>
             <a:endParaRPr lang="en-GB" dirty="0"/>
           </a:p>
         </p:txBody>
       </p:sp>
+      <p:pic>
+        <p:nvPicPr>
+          <p:cNvPr id="4099" name="Picture 3" descr="http://d2oah9q9xdinv5.cloudfront.net/images/engines/1/1/481/libGDX-RedGlossyNoReflection.png"/>
+          <p:cNvPicPr>
+            <a:picLocks noChangeAspect="1" noChangeArrowheads="1"/>
+          </p:cNvPicPr>
+          <p:nvPr/>
+        </p:nvPicPr>
+        <p:blipFill>
+          <a:blip r:embed="rId2" cstate="print"/>
+          <a:srcRect l="13477" t="29036" r="7357" b="34297"/>
+          <a:stretch>
+            <a:fillRect/>
+          </a:stretch>
+        </p:blipFill>
+        <p:spPr bwMode="auto">
+          <a:xfrm>
+            <a:off x="8087360" y="233680"/>
+            <a:ext cx="3860800" cy="894080"/>
+          </a:xfrm>
+          <a:prstGeom prst="rect">
+            <a:avLst/>
+          </a:prstGeom>
+          <a:noFill/>
+        </p:spPr>
+      </p:pic>
+      <p:pic>
+        <p:nvPicPr>
+          <p:cNvPr id="4101" name="Picture 5" descr="http://i27.tinypic.com/2462p9k.gif"/>
+          <p:cNvPicPr>
+            <a:picLocks noChangeAspect="1" noChangeArrowheads="1" noCrop="1"/>
+          </p:cNvPicPr>
+          <p:nvPr/>
+        </p:nvPicPr>
+        <p:blipFill>
+          <a:blip r:embed="rId3" cstate="print"/>
+          <a:srcRect/>
+          <a:stretch>
+            <a:fillRect/>
+          </a:stretch>
+        </p:blipFill>
+        <p:spPr bwMode="auto">
+          <a:xfrm>
+            <a:off x="7816214" y="2530157"/>
+            <a:ext cx="4307415" cy="3230563"/>
+          </a:xfrm>
+          <a:prstGeom prst="rect">
+            <a:avLst/>
+          </a:prstGeom>
+          <a:noFill/>
+          <a:effectLst>
+            <a:softEdge rad="317500"/>
+          </a:effectLst>
+        </p:spPr>
+      </p:pic>
+      <p:pic>
+        <p:nvPicPr>
+          <p:cNvPr id="4103" name="Picture 7" descr="https://enigma-dev.org/docs/wiki/images/a/ab/Box2d.png"/>
+          <p:cNvPicPr>
+            <a:picLocks noChangeAspect="1" noChangeArrowheads="1"/>
+          </p:cNvPicPr>
+          <p:nvPr/>
+        </p:nvPicPr>
+        <p:blipFill>
+          <a:blip r:embed="rId4" cstate="print"/>
+          <a:srcRect/>
+          <a:stretch>
+            <a:fillRect/>
+          </a:stretch>
+        </p:blipFill>
+        <p:spPr bwMode="auto">
+          <a:xfrm>
+            <a:off x="8039734" y="1292859"/>
+            <a:ext cx="3867785" cy="979839"/>
+          </a:xfrm>
+          <a:prstGeom prst="rect">
+            <a:avLst/>
+          </a:prstGeom>
+          <a:solidFill>
+            <a:schemeClr val="tx1"/>
+          </a:solidFill>
+        </p:spPr>
+      </p:pic>
     </p:spTree>
     <p:extLst>
       <p:ext uri="{BB962C8B-B14F-4D97-AF65-F5344CB8AC3E}">
-        <p14:creationId xmlns:p14="http://schemas.microsoft.com/office/powerpoint/2010/main" val="115225316"/>
+        <p14:creationId xmlns:p14="http://schemas.microsoft.com/office/powerpoint/2010/main" xmlns="" val="115225316"/>
       </p:ext>
     </p:extLst>
   </p:cSld>
   <p:clrMapOvr>
     <a:masterClrMapping/>
   </p:clrMapOvr>
+  <p:timing>
+    <p:tnLst>
+      <p:par>
+        <p:cTn id="1" dur="indefinite" restart="never" nodeType="tmRoot"/>
+      </p:par>
+    </p:tnLst>
+  </p:timing>
 </p:sld>
 </file>
 
@@ -6674,36 +7971,44 @@
           <a:lstStyle/>
           <a:p>
             <a:r>
-              <a:rPr lang="tr-TR" dirty="0" err="1"/>
-              <a:t>Large</a:t>
-            </a:r>
-            <a:r>
               <a:rPr lang="tr-TR" dirty="0"/>
-              <a:t> </a:t>
-            </a:r>
-            <a:r>
-              <a:rPr lang="tr-TR" dirty="0" err="1"/>
-              <a:t>dıagram</a:t>
+              <a:t>Large </a:t>
+            </a:r>
+            <a:r>
+              <a:rPr lang="en-US" dirty="0" smtClean="0"/>
+              <a:t>UML </a:t>
+            </a:r>
+            <a:r>
+              <a:rPr lang="tr-TR" dirty="0" smtClean="0"/>
+              <a:t>d</a:t>
+            </a:r>
+            <a:r>
+              <a:rPr lang="en-US" dirty="0" smtClean="0"/>
+              <a:t>I</a:t>
+            </a:r>
+            <a:r>
+              <a:rPr lang="tr-TR" dirty="0" smtClean="0"/>
+              <a:t>agram</a:t>
             </a:r>
             <a:r>
               <a:rPr lang="tr-TR" dirty="0"/>
-              <a:t>, </a:t>
-            </a:r>
-            <a:r>
-              <a:rPr lang="tr-TR" dirty="0" err="1"/>
-              <a:t>can’t</a:t>
+              <a:t>, can’t </a:t>
+            </a:r>
+            <a:r>
+              <a:rPr lang="tr-TR" dirty="0" smtClean="0"/>
+              <a:t>f</a:t>
+            </a:r>
+            <a:r>
+              <a:rPr lang="en-US" dirty="0" smtClean="0"/>
+              <a:t>I</a:t>
+            </a:r>
+            <a:r>
+              <a:rPr lang="tr-TR" dirty="0" smtClean="0"/>
+              <a:t>t </a:t>
             </a:r>
             <a:r>
               <a:rPr lang="tr-TR" dirty="0"/>
-              <a:t> </a:t>
-            </a:r>
-            <a:r>
-              <a:rPr lang="tr-TR" dirty="0" err="1"/>
-              <a:t>fıt</a:t>
-            </a:r>
-            <a:r>
-              <a:rPr lang="tr-TR" dirty="0"/>
-              <a:t> here  </a:t>
+              <a:t>here  </a:t>
             </a:r>
             <a:r>
               <a:rPr lang="en-US" altLang="ja-JP" dirty="0"/>
@@ -6738,11 +8043,13 @@
           </a:xfrm>
         </p:spPr>
         <p:txBody>
-          <a:bodyPr/>
-          <a:lstStyle/>
-          <a:p>
-            <a:r>
-              <a:rPr lang="en-GB" dirty="0"/>
+          <a:bodyPr>
+            <a:normAutofit/>
+          </a:bodyPr>
+          <a:lstStyle/>
+          <a:p>
+            <a:r>
+              <a:rPr lang="en-GB" sz="2400" i="1" dirty="0"/>
               <a:t>https://turkmenog.lu/static/cd8.png</a:t>
             </a:r>
           </a:p>
@@ -6751,13 +8058,20 @@
     </p:spTree>
     <p:extLst>
       <p:ext uri="{BB962C8B-B14F-4D97-AF65-F5344CB8AC3E}">
-        <p14:creationId xmlns:p14="http://schemas.microsoft.com/office/powerpoint/2010/main" val="2753056128"/>
+        <p14:creationId xmlns:p14="http://schemas.microsoft.com/office/powerpoint/2010/main" xmlns="" val="2753056128"/>
       </p:ext>
     </p:extLst>
   </p:cSld>
   <p:clrMapOvr>
     <a:masterClrMapping/>
   </p:clrMapOvr>
+  <p:timing>
+    <p:tnLst>
+      <p:par>
+        <p:cTn id="1" dur="indefinite" restart="never" nodeType="tmRoot"/>
+      </p:par>
+    </p:tnLst>
+  </p:timing>
 </p:sld>
 </file>
 
@@ -6794,31 +8108,27 @@
           <a:lstStyle/>
           <a:p>
             <a:r>
-              <a:rPr lang="tr-TR" dirty="0" err="1"/>
-              <a:t>Uml</a:t>
-            </a:r>
-            <a:r>
               <a:rPr lang="tr-TR" dirty="0"/>
-              <a:t> </a:t>
-            </a:r>
-            <a:r>
-              <a:rPr lang="tr-TR" dirty="0" err="1"/>
-              <a:t>some</a:t>
+              <a:t>Uml </a:t>
+            </a:r>
+            <a:r>
+              <a:rPr lang="en-US" dirty="0" smtClean="0"/>
+              <a:t> - </a:t>
+            </a:r>
+            <a:r>
+              <a:rPr lang="tr-TR" dirty="0" smtClean="0"/>
+              <a:t>some </a:t>
+            </a:r>
+            <a:r>
+              <a:rPr lang="en-US" dirty="0" smtClean="0"/>
+              <a:t>I</a:t>
+            </a:r>
+            <a:r>
+              <a:rPr lang="tr-TR" dirty="0" smtClean="0"/>
+              <a:t>mportant </a:t>
             </a:r>
             <a:r>
               <a:rPr lang="tr-TR" dirty="0"/>
-              <a:t> </a:t>
-            </a:r>
-            <a:r>
-              <a:rPr lang="tr-TR" dirty="0" err="1"/>
-              <a:t>ımportant</a:t>
-            </a:r>
-            <a:r>
-              <a:rPr lang="tr-TR" dirty="0"/>
-              <a:t> </a:t>
-            </a:r>
-            <a:r>
-              <a:rPr lang="tr-TR" dirty="0" err="1"/>
               <a:t>notes</a:t>
             </a:r>
             <a:endParaRPr lang="en-GB" dirty="0"/>
@@ -6838,140 +8148,60 @@
         <p:spPr/>
         <p:txBody>
           <a:bodyPr>
-            <a:normAutofit fontScale="85000" lnSpcReduction="20000"/>
+            <a:noAutofit/>
           </a:bodyPr>
           <a:lstStyle/>
           <a:p>
             <a:r>
-              <a:rPr lang="en-GB" dirty="0"/>
+              <a:rPr lang="en-GB" sz="2000" dirty="0"/>
               <a:t>The Level class does most of the work in the program including updating forces acting on the playable spacecraft.</a:t>
             </a:r>
           </a:p>
           <a:p>
             <a:r>
-              <a:rPr lang="en-GB" dirty="0"/>
+              <a:rPr lang="en-GB" sz="2000" dirty="0"/>
               <a:t>All game levels are extended from the Level class. Planets, assets, </a:t>
             </a:r>
             <a:r>
-              <a:rPr lang="en-GB" dirty="0" err="1"/>
+              <a:rPr lang="en-GB" sz="2000" dirty="0" err="1"/>
               <a:t>etc</a:t>
             </a:r>
             <a:r>
-              <a:rPr lang="en-GB" dirty="0"/>
+              <a:rPr lang="en-GB" sz="2000" dirty="0"/>
               <a:t>, are added to them.</a:t>
             </a:r>
           </a:p>
           <a:p>
             <a:r>
-              <a:rPr lang="en-GB" dirty="0"/>
+              <a:rPr lang="en-GB" sz="2000" dirty="0"/>
               <a:t>The map class determines the edges of the visible and playable map.</a:t>
             </a:r>
           </a:p>
           <a:p>
             <a:r>
-              <a:rPr lang="en-GB" dirty="0" err="1"/>
+              <a:rPr lang="en-GB" sz="2000" dirty="0" err="1"/>
               <a:t>SolidObject</a:t>
             </a:r>
             <a:r>
-              <a:rPr lang="en-GB" dirty="0"/>
+              <a:rPr lang="en-GB" sz="2000" dirty="0"/>
               <a:t> uses Box2D’s class, Body, for properties and methods of the physics engine.</a:t>
             </a:r>
           </a:p>
           <a:p>
             <a:r>
-              <a:rPr lang="en-GB" dirty="0"/>
+              <a:rPr lang="en-GB" sz="2000" dirty="0"/>
               <a:t>Playable objects include satellites or spaceships, depending on the level. They will be connected to controllers.</a:t>
             </a:r>
           </a:p>
           <a:p>
-            <a:r>
-              <a:rPr lang="en-GB" dirty="0"/>
-              <a:t>The </a:t>
-            </a:r>
-            <a:r>
-              <a:rPr lang="en-GB" dirty="0" err="1"/>
-              <a:t>PositionTrigger</a:t>
-            </a:r>
-            <a:r>
-              <a:rPr lang="en-GB" dirty="0"/>
-              <a:t> class is used for mission objectives. It listens for a </a:t>
-            </a:r>
-            <a:r>
-              <a:rPr lang="en-GB" dirty="0" err="1"/>
-              <a:t>SolidObject</a:t>
-            </a:r>
-            <a:r>
-              <a:rPr lang="en-GB" dirty="0"/>
-              <a:t> (that will most often be a Playable) to get within a certain radius of a point (like a Waypoint lo-cation) and then triggers an event depending on the mission scenario.</a:t>
-            </a:r>
-          </a:p>
-          <a:p>
-            <a:r>
-              <a:rPr lang="en-GB" dirty="0"/>
-              <a:t>The </a:t>
-            </a:r>
-            <a:r>
-              <a:rPr lang="en-GB" dirty="0" err="1"/>
-              <a:t>OutOfMapTrigger</a:t>
-            </a:r>
-            <a:r>
-              <a:rPr lang="en-GB" dirty="0"/>
-              <a:t> and </a:t>
-            </a:r>
-            <a:r>
-              <a:rPr lang="en-GB" dirty="0" err="1"/>
-              <a:t>FuelDepletionTrigger</a:t>
-            </a:r>
-            <a:r>
-              <a:rPr lang="en-GB" dirty="0"/>
-              <a:t> are for ending the game when their re-</a:t>
-            </a:r>
-            <a:r>
-              <a:rPr lang="en-GB" dirty="0" err="1"/>
-              <a:t>spective</a:t>
-            </a:r>
-            <a:r>
-              <a:rPr lang="en-GB" dirty="0"/>
-              <a:t> scenarios occur, and the </a:t>
-            </a:r>
-            <a:r>
-              <a:rPr lang="en-GB" dirty="0" err="1"/>
-              <a:t>PositionTrigger</a:t>
-            </a:r>
-            <a:r>
-              <a:rPr lang="en-GB" dirty="0"/>
-              <a:t> can be used to end the game when the rocket gets close enough to a </a:t>
-            </a:r>
-            <a:r>
-              <a:rPr lang="en-GB" dirty="0" err="1"/>
-              <a:t>SolidObject</a:t>
-            </a:r>
-            <a:r>
-              <a:rPr lang="en-GB" dirty="0"/>
-              <a:t> to crash.</a:t>
-            </a:r>
-          </a:p>
-          <a:p>
-            <a:r>
-              <a:rPr lang="en-GB" dirty="0"/>
-              <a:t>Due to the requirements of the Box2D engine, floats were used instead of doubles.</a:t>
-            </a:r>
-          </a:p>
-          <a:p>
-            <a:r>
-              <a:rPr lang="en-GB" dirty="0"/>
-              <a:t>Getter and setter methods were omitted in the UML diagram to prevent crowding, but are assumed to exist where appropriate.</a:t>
-            </a:r>
-          </a:p>
-          <a:p>
-            <a:endParaRPr lang="en-GB" dirty="0"/>
+            <a:endParaRPr lang="en-GB" sz="2000" dirty="0"/>
           </a:p>
         </p:txBody>
       </p:sp>
     </p:spTree>
     <p:extLst>
       <p:ext uri="{BB962C8B-B14F-4D97-AF65-F5344CB8AC3E}">
-        <p14:creationId xmlns:p14="http://schemas.microsoft.com/office/powerpoint/2010/main" val="3661861951"/>
+        <p14:creationId xmlns:p14="http://schemas.microsoft.com/office/powerpoint/2010/main" xmlns="" val="3661861951"/>
       </p:ext>
     </p:extLst>
   </p:cSld>
@@ -7008,23 +8238,35 @@
             <p:ph type="title"/>
           </p:nvPr>
         </p:nvSpPr>
-        <p:spPr>
-          <a:xfrm>
-            <a:off x="685801" y="609600"/>
-            <a:ext cx="3919653" cy="1297259"/>
-          </a:xfrm>
-        </p:spPr>
+        <p:spPr/>
         <p:txBody>
           <a:bodyPr/>
           <a:lstStyle/>
           <a:p>
             <a:r>
-              <a:rPr lang="en-GB" dirty="0"/>
-              <a:t>Task Assignment</a:t>
-            </a:r>
-            <a:br>
-              <a:rPr lang="en-GB" dirty="0"/>
-            </a:br>
+              <a:rPr lang="tr-TR" dirty="0"/>
+              <a:t>Uml </a:t>
+            </a:r>
+            <a:r>
+              <a:rPr lang="en-US" dirty="0" smtClean="0"/>
+              <a:t> - </a:t>
+            </a:r>
+            <a:r>
+              <a:rPr lang="tr-TR" dirty="0" smtClean="0"/>
+              <a:t>some </a:t>
+            </a:r>
+            <a:r>
+              <a:rPr lang="en-US" dirty="0" smtClean="0"/>
+              <a:t>I</a:t>
+            </a:r>
+            <a:r>
+              <a:rPr lang="tr-TR" dirty="0" smtClean="0"/>
+              <a:t>mportant </a:t>
+            </a:r>
+            <a:r>
+              <a:rPr lang="tr-TR" dirty="0"/>
+              <a:t>notes</a:t>
+            </a:r>
             <a:endParaRPr lang="en-GB" dirty="0"/>
           </a:p>
         </p:txBody>
@@ -7039,348 +8281,101 @@
             <p:ph idx="1"/>
           </p:nvPr>
         </p:nvSpPr>
-        <p:spPr>
-          <a:xfrm>
-            <a:off x="473929" y="2379102"/>
-            <a:ext cx="7153506" cy="3489299"/>
-          </a:xfrm>
-        </p:spPr>
+        <p:spPr/>
         <p:txBody>
           <a:bodyPr>
-            <a:normAutofit fontScale="25000" lnSpcReduction="20000"/>
+            <a:noAutofit/>
           </a:bodyPr>
           <a:lstStyle/>
           <a:p>
-            <a:pPr marL="457200" lvl="1" indent="0">
-              <a:buNone/>
-            </a:pPr>
-            <a:r>
-              <a:rPr lang="en-GB" sz="7000" dirty="0"/>
-              <a:t>Ömer</a:t>
-            </a:r>
-            <a:r>
-              <a:rPr lang="tr-TR" sz="7000" dirty="0"/>
-              <a:t>:</a:t>
-            </a:r>
-            <a:endParaRPr lang="en-GB" sz="7000" dirty="0"/>
-          </a:p>
-          <a:p>
-            <a:r>
-              <a:rPr lang="en-GB" sz="7200" dirty="0"/>
-              <a:t>	In-Game screen GUI (some parts)</a:t>
-            </a:r>
-          </a:p>
-          <a:p>
-            <a:r>
-              <a:rPr lang="en-GB" sz="7200" dirty="0"/>
-              <a:t>	Scenario and script preparation</a:t>
-            </a:r>
-            <a:endParaRPr lang="tr-TR" sz="7200" dirty="0"/>
-          </a:p>
-          <a:p>
-            <a:endParaRPr lang="en-GB" sz="7200" dirty="0"/>
-          </a:p>
-          <a:p>
-            <a:pPr marL="0" indent="0">
-              <a:buNone/>
-            </a:pPr>
-            <a:r>
-              <a:rPr lang="en-GB" sz="7200" dirty="0"/>
-              <a:t>	Alperen</a:t>
-            </a:r>
-            <a:r>
-              <a:rPr lang="tr-TR" sz="7200" dirty="0"/>
-              <a:t>:</a:t>
-            </a:r>
-            <a:endParaRPr lang="en-GB" sz="7200" dirty="0"/>
-          </a:p>
-          <a:p>
-            <a:r>
-              <a:rPr lang="en-GB" sz="7200" dirty="0"/>
-              <a:t>	Menu screens’ classes and GUI</a:t>
-            </a:r>
-          </a:p>
-          <a:p>
-            <a:r>
-              <a:rPr lang="en-GB" sz="7200" dirty="0"/>
-              <a:t>	Animations and graphics</a:t>
-            </a:r>
-          </a:p>
-          <a:p>
-            <a:r>
-              <a:rPr lang="en-GB" sz="7200" dirty="0"/>
-              <a:t>	</a:t>
-            </a:r>
-            <a:r>
-              <a:rPr lang="en-GB" sz="7200" dirty="0" err="1"/>
-              <a:t>Cutscenes</a:t>
-            </a:r>
-            <a:r>
-              <a:rPr lang="en-GB" sz="7200" dirty="0"/>
-              <a:t> </a:t>
-            </a:r>
-          </a:p>
-          <a:p>
-            <a:r>
-              <a:rPr lang="en-GB" sz="7200" dirty="0"/>
-              <a:t>	Sounds </a:t>
-            </a:r>
-          </a:p>
-          <a:p>
-            <a:pPr marL="0" indent="0">
-              <a:buNone/>
-            </a:pPr>
-            <a:endParaRPr lang="tr-TR" sz="7200" dirty="0"/>
-          </a:p>
-          <a:p>
-            <a:pPr marL="0" indent="0">
-              <a:buNone/>
-            </a:pPr>
-            <a:r>
-              <a:rPr lang="en-GB" sz="7200" dirty="0"/>
-              <a:t>	Levent</a:t>
-            </a:r>
-            <a:r>
-              <a:rPr lang="tr-TR" sz="7200" dirty="0"/>
-              <a:t>:</a:t>
-            </a:r>
-            <a:endParaRPr lang="en-GB" sz="7200" dirty="0"/>
-          </a:p>
-          <a:p>
-            <a:r>
-              <a:rPr lang="en-GB" sz="7200" dirty="0"/>
-              <a:t>	</a:t>
-            </a:r>
-            <a:r>
-              <a:rPr lang="en-GB" sz="7200" dirty="0" err="1"/>
-              <a:t>SaveState</a:t>
-            </a:r>
-            <a:r>
-              <a:rPr lang="en-GB" sz="7200" dirty="0"/>
-              <a:t> class</a:t>
-            </a:r>
-          </a:p>
-          <a:p>
-            <a:r>
-              <a:rPr lang="en-GB" sz="7200" dirty="0"/>
-              <a:t>	Level class (some of the methods)</a:t>
-            </a:r>
-          </a:p>
-          <a:p>
-            <a:r>
-              <a:rPr lang="en-GB" sz="7200" dirty="0"/>
-              <a:t>	Learning content preparation</a:t>
-            </a:r>
-          </a:p>
-          <a:p>
-            <a:endParaRPr lang="en-GB" dirty="0"/>
-          </a:p>
-        </p:txBody>
-      </p:sp>
-      <p:sp>
-        <p:nvSpPr>
-          <p:cNvPr id="4" name="TextBox 3"/>
-          <p:cNvSpPr txBox="1"/>
-          <p:nvPr/>
-        </p:nvSpPr>
-        <p:spPr>
-          <a:xfrm>
-            <a:off x="6322743" y="609600"/>
-            <a:ext cx="5999356" cy="7294305"/>
-          </a:xfrm>
-          <a:prstGeom prst="rect">
-            <a:avLst/>
-          </a:prstGeom>
-          <a:noFill/>
-        </p:spPr>
-        <p:txBody>
-          <a:bodyPr wrap="square" rtlCol="0">
-            <a:spAutoFit/>
-          </a:bodyPr>
-          <a:lstStyle/>
-          <a:p>
-            <a:r>
-              <a:rPr lang="tr-TR" dirty="0"/>
-              <a:t>	</a:t>
-            </a:r>
-            <a:r>
-              <a:rPr lang="en-GB" dirty="0"/>
-              <a:t>Hakan</a:t>
-            </a:r>
-            <a:r>
-              <a:rPr lang="tr-TR" dirty="0"/>
-              <a:t>:</a:t>
-            </a:r>
-            <a:endParaRPr lang="en-GB" dirty="0"/>
-          </a:p>
-          <a:p>
-            <a:r>
-              <a:rPr lang="en-GB" dirty="0"/>
-              <a:t>•	Playable class</a:t>
-            </a:r>
-          </a:p>
-          <a:p>
-            <a:r>
-              <a:rPr lang="en-GB" dirty="0"/>
-              <a:t>•	</a:t>
-            </a:r>
-            <a:r>
-              <a:rPr lang="en-GB" dirty="0" err="1"/>
-              <a:t>GameObject</a:t>
-            </a:r>
-            <a:r>
-              <a:rPr lang="en-GB" dirty="0"/>
+            <a:r>
+              <a:rPr lang="en-GB" sz="2000" dirty="0" smtClean="0"/>
+              <a:t>The </a:t>
+            </a:r>
+            <a:r>
+              <a:rPr lang="en-GB" sz="2000" dirty="0" err="1"/>
+              <a:t>PositionTrigger</a:t>
+            </a:r>
+            <a:r>
+              <a:rPr lang="en-GB" sz="2000" dirty="0"/>
+              <a:t> class is used for mission objectives. It listens for a </a:t>
+            </a:r>
+            <a:r>
+              <a:rPr lang="en-GB" sz="2000" dirty="0" err="1"/>
+              <a:t>SolidObject</a:t>
+            </a:r>
+            <a:r>
+              <a:rPr lang="en-GB" sz="2000" dirty="0"/>
+              <a:t> (that will most often be a Playable) to get within a certain radius of a point (like a Waypoint lo-cation) and then triggers an event depending on the mission scenario.</a:t>
+            </a:r>
+          </a:p>
+          <a:p>
+            <a:r>
+              <a:rPr lang="en-GB" sz="2000" dirty="0"/>
+              <a:t>The </a:t>
+            </a:r>
+            <a:r>
+              <a:rPr lang="en-GB" sz="2000" dirty="0" err="1"/>
+              <a:t>OutOfMapTrigger</a:t>
+            </a:r>
+            <a:r>
+              <a:rPr lang="en-GB" sz="2000" dirty="0"/>
               <a:t> and </a:t>
             </a:r>
             <a:r>
-              <a:rPr lang="en-GB" dirty="0" err="1"/>
+              <a:rPr lang="en-GB" sz="2000" dirty="0" err="1"/>
+              <a:t>FuelDepletionTrigger</a:t>
+            </a:r>
+            <a:r>
+              <a:rPr lang="en-GB" sz="2000" dirty="0"/>
+              <a:t> are for ending the game when their re-</a:t>
+            </a:r>
+            <a:r>
+              <a:rPr lang="en-GB" sz="2000" dirty="0" err="1"/>
+              <a:t>spective</a:t>
+            </a:r>
+            <a:r>
+              <a:rPr lang="en-GB" sz="2000" dirty="0"/>
+              <a:t> scenarios occur, and the </a:t>
+            </a:r>
+            <a:r>
+              <a:rPr lang="en-GB" sz="2000" dirty="0" err="1"/>
+              <a:t>PositionTrigger</a:t>
+            </a:r>
+            <a:r>
+              <a:rPr lang="en-GB" sz="2000" dirty="0"/>
+              <a:t> can be used to end the game when the rocket gets close enough to a </a:t>
+            </a:r>
+            <a:r>
+              <a:rPr lang="en-GB" sz="2000" dirty="0" err="1"/>
               <a:t>SolidObject</a:t>
             </a:r>
             <a:r>
-              <a:rPr lang="en-GB" dirty="0"/>
-              <a:t> classes</a:t>
-            </a:r>
-          </a:p>
-          <a:p>
-            <a:r>
-              <a:rPr lang="en-GB" dirty="0"/>
-              <a:t>•	Celestial Body class and subclasses</a:t>
-            </a:r>
-          </a:p>
-          <a:p>
-            <a:r>
-              <a:rPr lang="en-GB" dirty="0"/>
-              <a:t>•	Level class (most of it)</a:t>
-            </a:r>
-          </a:p>
-          <a:p>
-            <a:r>
-              <a:rPr lang="en-GB" dirty="0"/>
-              <a:t>•	Control classes</a:t>
-            </a:r>
-          </a:p>
-          <a:p>
-            <a:r>
-              <a:rPr lang="en-GB" dirty="0"/>
-              <a:t>•	Camera/viewpoint classes</a:t>
-            </a:r>
-            <a:endParaRPr lang="tr-TR" dirty="0"/>
-          </a:p>
-          <a:p>
-            <a:endParaRPr lang="tr-TR" dirty="0"/>
-          </a:p>
-          <a:p>
-            <a:r>
-              <a:rPr lang="en-GB" dirty="0"/>
-              <a:t>	Yaman</a:t>
-            </a:r>
-            <a:r>
-              <a:rPr lang="tr-TR" dirty="0"/>
-              <a:t>:</a:t>
-            </a:r>
-            <a:endParaRPr lang="en-GB" dirty="0"/>
-          </a:p>
-          <a:p>
-            <a:r>
-              <a:rPr lang="en-GB" dirty="0"/>
-              <a:t>•	In-Game screen GUI (some parts)</a:t>
-            </a:r>
-          </a:p>
-          <a:p>
-            <a:r>
-              <a:rPr lang="en-GB" dirty="0"/>
-              <a:t>•	Map class</a:t>
-            </a:r>
-          </a:p>
-          <a:p>
-            <a:r>
-              <a:rPr lang="en-GB" dirty="0"/>
-              <a:t>•	Obstacle classes</a:t>
-            </a:r>
-          </a:p>
-          <a:p>
-            <a:r>
-              <a:rPr lang="en-GB" dirty="0"/>
-              <a:t>•	Waypoint class</a:t>
-            </a:r>
-          </a:p>
-          <a:p>
-            <a:r>
-              <a:rPr lang="en-GB" dirty="0"/>
-              <a:t>•	Trigger classes</a:t>
-            </a:r>
-          </a:p>
-          <a:p>
-            <a:endParaRPr lang="tr-TR" dirty="0"/>
-          </a:p>
-          <a:p>
-            <a:r>
-              <a:rPr lang="en-GB" dirty="0"/>
-              <a:t>	All group members</a:t>
-            </a:r>
-            <a:r>
-              <a:rPr lang="tr-TR" dirty="0"/>
-              <a:t>:</a:t>
-            </a:r>
-            <a:endParaRPr lang="en-GB" dirty="0"/>
-          </a:p>
-          <a:p>
-            <a:r>
-              <a:rPr lang="en-GB" dirty="0"/>
-              <a:t>•	Level design and coding</a:t>
-            </a:r>
-          </a:p>
-          <a:p>
-            <a:r>
-              <a:rPr lang="en-GB" dirty="0"/>
-              <a:t>•	Debugging</a:t>
-            </a:r>
-          </a:p>
-          <a:p>
-            <a:r>
-              <a:rPr lang="en-GB" dirty="0"/>
-              <a:t>•	Balancing</a:t>
-            </a:r>
-          </a:p>
-          <a:p>
-            <a:r>
-              <a:rPr lang="en-GB" dirty="0"/>
-              <a:t>•	Playtesting and reflecting</a:t>
-            </a:r>
-          </a:p>
-          <a:p>
-            <a:r>
-              <a:rPr lang="en-GB" dirty="0"/>
-              <a:t>•	Collecting assets, such as illustrations for dialog boxes or </a:t>
-            </a:r>
-            <a:r>
-              <a:rPr lang="tr-TR" dirty="0"/>
-              <a:t>	</a:t>
-            </a:r>
-            <a:r>
-              <a:rPr lang="en-GB" dirty="0"/>
-              <a:t>music</a:t>
-            </a:r>
-            <a:endParaRPr lang="tr-TR" dirty="0"/>
-          </a:p>
-          <a:p>
-            <a:endParaRPr lang="tr-TR" dirty="0"/>
-          </a:p>
-          <a:p>
-            <a:r>
-              <a:rPr lang="en-GB" dirty="0"/>
-              <a:t>.</a:t>
-            </a:r>
-          </a:p>
-          <a:p>
-            <a:endParaRPr lang="en-GB" dirty="0"/>
+              <a:rPr lang="en-GB" sz="2000" dirty="0"/>
+              <a:t> to crash.</a:t>
+            </a:r>
+          </a:p>
+          <a:p>
+            <a:r>
+              <a:rPr lang="en-GB" sz="2000" dirty="0"/>
+              <a:t>Due to the requirements of the Box2D engine, floats were used instead of doubles.</a:t>
+            </a:r>
+          </a:p>
+          <a:p>
+            <a:r>
+              <a:rPr lang="en-GB" sz="2000" dirty="0"/>
+              <a:t>Getter and setter methods were omitted in the UML diagram to prevent crowding, but are assumed to exist where appropriate.</a:t>
+            </a:r>
+          </a:p>
+          <a:p>
+            <a:endParaRPr lang="en-GB" sz="2000" dirty="0"/>
           </a:p>
         </p:txBody>
       </p:sp>
     </p:spTree>
     <p:extLst>
       <p:ext uri="{BB962C8B-B14F-4D97-AF65-F5344CB8AC3E}">
-        <p14:creationId xmlns:p14="http://schemas.microsoft.com/office/powerpoint/2010/main" val="3618809772"/>
+        <p14:creationId xmlns:p14="http://schemas.microsoft.com/office/powerpoint/2010/main" xmlns="" val="3661861951"/>
       </p:ext>
     </p:extLst>
   </p:cSld>
@@ -7433,7 +8428,7 @@
     </a:clrScheme>
     <a:fontScheme name="Celestial">
       <a:majorFont>
-        <a:latin typeface="Calibri Light" panose="020F0302020204030204"/>
+        <a:latin typeface="Calibri Light"/>
         <a:ea typeface=""/>
         <a:cs typeface=""/>
         <a:font script="Jpan" typeface="ＭＳ Ｐゴシック"/>
@@ -7468,7 +8463,7 @@
         <a:font script="Geor" typeface="Sylfaen"/>
       </a:majorFont>
       <a:minorFont>
-        <a:latin typeface="Calibri" panose="020F0502020204030204"/>
+        <a:latin typeface="Calibri"/>
         <a:ea typeface=""/>
         <a:cs typeface=""/>
         <a:font script="Jpan" typeface="ＭＳ Ｐゴシック"/>
@@ -7633,7 +8628,7 @@
   <a:extraClrSchemeLst/>
   <a:extLst>
     <a:ext uri="{05A4C25C-085E-4340-85A3-A5531E510DB2}">
-      <thm15:themeFamily xmlns:thm15="http://schemas.microsoft.com/office/thememl/2012/main" name="Celestial" id="{C4BB2A3D-0E93-4C5F-B0D2-9D3FCE089CC5}" vid="{42E5908D-19A2-46FD-89FA-638B126129EF}"/>
+      <thm15:themeFamily xmlns:thm15="http://schemas.microsoft.com/office/thememl/2012/main" xmlns="" name="Celestial" id="{C4BB2A3D-0E93-4C5F-B0D2-9D3FCE089CC5}" vid="{42E5908D-19A2-46FD-89FA-638B126129EF}"/>
     </a:ext>
   </a:extLst>
 </a:theme>

</xml_diff>